<commit_message>
5 different models evaluated and saved
</commit_message>
<xml_diff>
--- a/deep-learning-fire-detection.pptx
+++ b/deep-learning-fire-detection.pptx
@@ -21,7 +21,7 @@
     <p:sldId id="266" r:id="rId15"/>
     <p:sldId id="276" r:id="rId16"/>
     <p:sldId id="274" r:id="rId17"/>
-    <p:sldId id="283" r:id="rId18"/>
+    <p:sldId id="287" r:id="rId18"/>
     <p:sldId id="271" r:id="rId19"/>
     <p:sldId id="273" r:id="rId20"/>
     <p:sldId id="268" r:id="rId21"/>
@@ -23518,6 +23518,14 @@
 <file path=ppt/slides/slide17.xml><?xml version="1.0" encoding="utf-8"?>
 <p:sld xmlns:a="http://schemas.openxmlformats.org/drawingml/2006/main" xmlns:r="http://schemas.openxmlformats.org/officeDocument/2006/relationships" xmlns:p="http://schemas.openxmlformats.org/presentationml/2006/main">
   <p:cSld>
+    <p:bg>
+      <p:bgPr>
+        <a:solidFill>
+          <a:schemeClr val="bg2"/>
+        </a:solidFill>
+        <a:effectLst/>
+      </p:bgPr>
+    </p:bg>
     <p:spTree>
       <p:nvGrpSpPr>
         <p:cNvPr id="1" name=""/>
@@ -23534,10 +23542,1497 @@
       </p:grpSpPr>
       <p:sp>
         <p:nvSpPr>
+          <p:cNvPr id="40" name="Rectangle 15">
+            <a:extLst>
+              <a:ext uri="{FF2B5EF4-FFF2-40B4-BE49-F238E27FC236}">
+                <a16:creationId xmlns:a16="http://schemas.microsoft.com/office/drawing/2014/main" id="{A3BAF07C-C39E-42EB-BB22-8D46691D9735}"/>
+              </a:ext>
+              <a:ext uri="{C183D7F6-B498-43B3-948B-1728B52AA6E4}">
+                <adec:decorative xmlns:adec="http://schemas.microsoft.com/office/drawing/2017/decorative" val="1"/>
+              </a:ext>
+            </a:extLst>
+          </p:cNvPr>
+          <p:cNvSpPr>
+            <a:spLocks noGrp="1" noRot="1" noChangeAspect="1" noMove="1" noResize="1" noEditPoints="1" noAdjustHandles="1" noChangeArrowheads="1" noChangeShapeType="1" noTextEdit="1"/>
+          </p:cNvSpPr>
+          <p:nvPr>
+            <p:extLst>
+              <p:ext uri="{386F3935-93C4-4BCD-93E2-E3B085C9AB24}">
+                <p16:designElem xmlns:p16="http://schemas.microsoft.com/office/powerpoint/2015/main" val="1"/>
+              </p:ext>
+            </p:extLst>
+          </p:nvPr>
+        </p:nvSpPr>
+        <p:spPr>
+          <a:xfrm>
+            <a:off x="-1" y="0"/>
+            <a:ext cx="12193061" cy="6858000"/>
+          </a:xfrm>
+          <a:prstGeom prst="rect">
+            <a:avLst/>
+          </a:prstGeom>
+          <a:solidFill>
+            <a:schemeClr val="bg2"/>
+          </a:solidFill>
+          <a:ln>
+            <a:noFill/>
+          </a:ln>
+        </p:spPr>
+        <p:style>
+          <a:lnRef idx="2">
+            <a:schemeClr val="accent1">
+              <a:shade val="50000"/>
+            </a:schemeClr>
+          </a:lnRef>
+          <a:fillRef idx="1">
+            <a:schemeClr val="accent1"/>
+          </a:fillRef>
+          <a:effectRef idx="0">
+            <a:schemeClr val="accent1"/>
+          </a:effectRef>
+          <a:fontRef idx="minor">
+            <a:schemeClr val="lt1"/>
+          </a:fontRef>
+        </p:style>
+        <p:txBody>
+          <a:bodyPr rtlCol="0" anchor="ctr"/>
+          <a:lstStyle/>
+          <a:p>
+            <a:pPr algn="ctr"/>
+            <a:endParaRPr lang="en-US"/>
+          </a:p>
+        </p:txBody>
+      </p:sp>
+      <p:grpSp>
+        <p:nvGrpSpPr>
+          <p:cNvPr id="41" name="Group 17">
+            <a:extLst>
+              <a:ext uri="{FF2B5EF4-FFF2-40B4-BE49-F238E27FC236}">
+                <a16:creationId xmlns:a16="http://schemas.microsoft.com/office/drawing/2014/main" id="{D8E9CF54-0466-4261-9E62-0249E60E1886}"/>
+              </a:ext>
+              <a:ext uri="{C183D7F6-B498-43B3-948B-1728B52AA6E4}">
+                <adec:decorative xmlns:adec="http://schemas.microsoft.com/office/drawing/2017/decorative" val="1"/>
+              </a:ext>
+            </a:extLst>
+          </p:cNvPr>
+          <p:cNvGrpSpPr>
+            <a:grpSpLocks noGrp="1" noUngrp="1" noRot="1" noChangeAspect="1" noMove="1" noResize="1"/>
+          </p:cNvGrpSpPr>
+          <p:nvPr>
+            <p:extLst>
+              <p:ext uri="{386F3935-93C4-4BCD-93E2-E3B085C9AB24}">
+                <p16:designElem xmlns:p16="http://schemas.microsoft.com/office/powerpoint/2015/main" val="1"/>
+              </p:ext>
+            </p:extLst>
+          </p:nvPr>
+        </p:nvGrpSpPr>
+        <p:grpSpPr>
+          <a:xfrm>
+            <a:off x="-329674" y="-59376"/>
+            <a:ext cx="12515851" cy="6923798"/>
+            <a:chOff x="-329674" y="-51881"/>
+            <a:chExt cx="12515851" cy="6923798"/>
+          </a:xfrm>
+        </p:grpSpPr>
+        <p:sp>
+          <p:nvSpPr>
+            <p:cNvPr id="19" name="Freeform 5">
+              <a:extLst>
+                <a:ext uri="{FF2B5EF4-FFF2-40B4-BE49-F238E27FC236}">
+                  <a16:creationId xmlns:a16="http://schemas.microsoft.com/office/drawing/2014/main" id="{33E32106-E8B1-4F76-9EE6-58537738A3C4}"/>
+                </a:ext>
+                <a:ext uri="{C183D7F6-B498-43B3-948B-1728B52AA6E4}">
+                  <adec:decorative xmlns:adec="http://schemas.microsoft.com/office/drawing/2017/decorative" val="1"/>
+                </a:ext>
+              </a:extLst>
+            </p:cNvPr>
+            <p:cNvSpPr/>
+            <p:nvPr>
+              <p:extLst>
+                <p:ext uri="{386F3935-93C4-4BCD-93E2-E3B085C9AB24}">
+                  <p16:designElem xmlns:p16="http://schemas.microsoft.com/office/powerpoint/2015/main" val="1"/>
+                </p:ext>
+              </p:extLst>
+            </p:nvPr>
+          </p:nvSpPr>
+          <p:spPr bwMode="auto">
+            <a:xfrm>
+              <a:off x="-329674" y="1298404"/>
+              <a:ext cx="9702800" cy="5573512"/>
+            </a:xfrm>
+            <a:custGeom>
+              <a:avLst/>
+              <a:gdLst/>
+              <a:ahLst/>
+              <a:cxnLst/>
+              <a:rect l="0" t="0" r="r" b="b"/>
+              <a:pathLst>
+                <a:path w="2038" h="1169">
+                  <a:moveTo>
+                    <a:pt x="1752" y="1169"/>
+                  </a:moveTo>
+                  <a:cubicBezTo>
+                    <a:pt x="2038" y="928"/>
+                    <a:pt x="1673" y="513"/>
+                    <a:pt x="1487" y="334"/>
+                  </a:cubicBezTo>
+                  <a:cubicBezTo>
+                    <a:pt x="1316" y="170"/>
+                    <a:pt x="1099" y="43"/>
+                    <a:pt x="860" y="22"/>
+                  </a:cubicBezTo>
+                  <a:cubicBezTo>
+                    <a:pt x="621" y="0"/>
+                    <a:pt x="341" y="128"/>
+                    <a:pt x="199" y="318"/>
+                  </a:cubicBezTo>
+                  <a:cubicBezTo>
+                    <a:pt x="0" y="586"/>
+                    <a:pt x="184" y="965"/>
+                    <a:pt x="399" y="1165"/>
+                  </a:cubicBezTo>
+                </a:path>
+              </a:pathLst>
+            </a:custGeom>
+            <a:noFill/>
+            <a:ln w="9525" cap="flat">
+              <a:solidFill>
+                <a:schemeClr val="tx1">
+                  <a:alpha val="35000"/>
+                </a:schemeClr>
+              </a:solidFill>
+              <a:prstDash val="solid"/>
+              <a:miter lim="800000"/>
+              <a:headEnd/>
+              <a:tailEnd/>
+            </a:ln>
+            <a:extLst>
+              <a:ext uri="{909E8E84-426E-40DD-AFC4-6F175D3DCCD1}">
+                <a14:hiddenFill xmlns:a14="http://schemas.microsoft.com/office/drawing/2010/main">
+                  <a:solidFill>
+                    <a:srgbClr val="FFFFFF"/>
+                  </a:solidFill>
+                </a14:hiddenFill>
+              </a:ext>
+            </a:extLst>
+          </p:spPr>
+        </p:sp>
+        <p:sp>
+          <p:nvSpPr>
+            <p:cNvPr id="20" name="Freeform 6">
+              <a:extLst>
+                <a:ext uri="{FF2B5EF4-FFF2-40B4-BE49-F238E27FC236}">
+                  <a16:creationId xmlns:a16="http://schemas.microsoft.com/office/drawing/2014/main" id="{C32C2C46-A045-44FB-8A74-5EBD650C2787}"/>
+                </a:ext>
+                <a:ext uri="{C183D7F6-B498-43B3-948B-1728B52AA6E4}">
+                  <adec:decorative xmlns:adec="http://schemas.microsoft.com/office/drawing/2017/decorative" val="1"/>
+                </a:ext>
+              </a:extLst>
+            </p:cNvPr>
+            <p:cNvSpPr/>
+            <p:nvPr>
+              <p:extLst>
+                <p:ext uri="{386F3935-93C4-4BCD-93E2-E3B085C9AB24}">
+                  <p16:designElem xmlns:p16="http://schemas.microsoft.com/office/powerpoint/2015/main" val="1"/>
+                </p:ext>
+              </p:extLst>
+            </p:nvPr>
+          </p:nvSpPr>
+          <p:spPr bwMode="auto">
+            <a:xfrm>
+              <a:off x="670451" y="2018236"/>
+              <a:ext cx="7373938" cy="4848892"/>
+            </a:xfrm>
+            <a:custGeom>
+              <a:avLst/>
+              <a:gdLst/>
+              <a:ahLst/>
+              <a:cxnLst/>
+              <a:rect l="0" t="0" r="r" b="b"/>
+              <a:pathLst>
+                <a:path w="1549" h="1017">
+                  <a:moveTo>
+                    <a:pt x="1025" y="1016"/>
+                  </a:moveTo>
+                  <a:cubicBezTo>
+                    <a:pt x="1223" y="971"/>
+                    <a:pt x="1549" y="857"/>
+                    <a:pt x="1443" y="592"/>
+                  </a:cubicBezTo>
+                  <a:cubicBezTo>
+                    <a:pt x="1344" y="344"/>
+                    <a:pt x="1041" y="111"/>
+                    <a:pt x="782" y="53"/>
+                  </a:cubicBezTo>
+                  <a:cubicBezTo>
+                    <a:pt x="545" y="0"/>
+                    <a:pt x="275" y="117"/>
+                    <a:pt x="150" y="329"/>
+                  </a:cubicBezTo>
+                  <a:cubicBezTo>
+                    <a:pt x="0" y="584"/>
+                    <a:pt x="243" y="911"/>
+                    <a:pt x="477" y="1017"/>
+                  </a:cubicBezTo>
+                </a:path>
+              </a:pathLst>
+            </a:custGeom>
+            <a:noFill/>
+            <a:ln w="9525" cap="flat">
+              <a:solidFill>
+                <a:schemeClr val="tx1">
+                  <a:alpha val="35000"/>
+                </a:schemeClr>
+              </a:solidFill>
+              <a:prstDash val="solid"/>
+              <a:miter lim="800000"/>
+              <a:headEnd/>
+              <a:tailEnd/>
+            </a:ln>
+            <a:extLst>
+              <a:ext uri="{909E8E84-426E-40DD-AFC4-6F175D3DCCD1}">
+                <a14:hiddenFill xmlns:a14="http://schemas.microsoft.com/office/drawing/2010/main">
+                  <a:solidFill>
+                    <a:srgbClr val="FFFFFF"/>
+                  </a:solidFill>
+                </a14:hiddenFill>
+              </a:ext>
+            </a:extLst>
+          </p:spPr>
+        </p:sp>
+        <p:sp>
+          <p:nvSpPr>
+            <p:cNvPr id="21" name="Freeform 7">
+              <a:extLst>
+                <a:ext uri="{FF2B5EF4-FFF2-40B4-BE49-F238E27FC236}">
+                  <a16:creationId xmlns:a16="http://schemas.microsoft.com/office/drawing/2014/main" id="{6A76F79C-6683-4940-BCF7-4BCCCEE40688}"/>
+                </a:ext>
+                <a:ext uri="{C183D7F6-B498-43B3-948B-1728B52AA6E4}">
+                  <adec:decorative xmlns:adec="http://schemas.microsoft.com/office/drawing/2017/decorative" val="1"/>
+                </a:ext>
+              </a:extLst>
+            </p:cNvPr>
+            <p:cNvSpPr/>
+            <p:nvPr>
+              <p:extLst>
+                <p:ext uri="{386F3935-93C4-4BCD-93E2-E3B085C9AB24}">
+                  <p16:designElem xmlns:p16="http://schemas.microsoft.com/office/powerpoint/2015/main" val="1"/>
+                </p:ext>
+              </p:extLst>
+            </p:nvPr>
+          </p:nvSpPr>
+          <p:spPr bwMode="auto">
+            <a:xfrm>
+              <a:off x="251351" y="1788400"/>
+              <a:ext cx="8035925" cy="5083516"/>
+            </a:xfrm>
+            <a:custGeom>
+              <a:avLst/>
+              <a:gdLst/>
+              <a:ahLst/>
+              <a:cxnLst/>
+              <a:rect l="0" t="0" r="r" b="b"/>
+              <a:pathLst>
+                <a:path w="1688" h="1066">
+                  <a:moveTo>
+                    <a:pt x="1302" y="1066"/>
+                  </a:moveTo>
+                  <a:cubicBezTo>
+                    <a:pt x="1416" y="1024"/>
+                    <a:pt x="1551" y="962"/>
+                    <a:pt x="1613" y="850"/>
+                  </a:cubicBezTo>
+                  <a:cubicBezTo>
+                    <a:pt x="1688" y="715"/>
+                    <a:pt x="1606" y="575"/>
+                    <a:pt x="1517" y="471"/>
+                  </a:cubicBezTo>
+                  <a:cubicBezTo>
+                    <a:pt x="1336" y="258"/>
+                    <a:pt x="1084" y="62"/>
+                    <a:pt x="798" y="28"/>
+                  </a:cubicBezTo>
+                  <a:cubicBezTo>
+                    <a:pt x="559" y="0"/>
+                    <a:pt x="317" y="138"/>
+                    <a:pt x="181" y="333"/>
+                  </a:cubicBezTo>
+                  <a:cubicBezTo>
+                    <a:pt x="0" y="592"/>
+                    <a:pt x="191" y="907"/>
+                    <a:pt x="420" y="1066"/>
+                  </a:cubicBezTo>
+                </a:path>
+              </a:pathLst>
+            </a:custGeom>
+            <a:noFill/>
+            <a:ln w="9525" cap="flat">
+              <a:solidFill>
+                <a:schemeClr val="tx1">
+                  <a:alpha val="35000"/>
+                </a:schemeClr>
+              </a:solidFill>
+              <a:prstDash val="dash"/>
+              <a:miter lim="800000"/>
+              <a:headEnd/>
+              <a:tailEnd/>
+            </a:ln>
+            <a:extLst>
+              <a:ext uri="{909E8E84-426E-40DD-AFC4-6F175D3DCCD1}">
+                <a14:hiddenFill xmlns:a14="http://schemas.microsoft.com/office/drawing/2010/main">
+                  <a:solidFill>
+                    <a:srgbClr val="FFFFFF"/>
+                  </a:solidFill>
+                </a14:hiddenFill>
+              </a:ext>
+            </a:extLst>
+          </p:spPr>
+        </p:sp>
+        <p:sp>
+          <p:nvSpPr>
+            <p:cNvPr id="22" name="Freeform 8">
+              <a:extLst>
+                <a:ext uri="{FF2B5EF4-FFF2-40B4-BE49-F238E27FC236}">
+                  <a16:creationId xmlns:a16="http://schemas.microsoft.com/office/drawing/2014/main" id="{FF4675A3-6D07-4B1F-9BFC-AEBEA1AD067D}"/>
+                </a:ext>
+                <a:ext uri="{C183D7F6-B498-43B3-948B-1728B52AA6E4}">
+                  <adec:decorative xmlns:adec="http://schemas.microsoft.com/office/drawing/2017/decorative" val="1"/>
+                </a:ext>
+              </a:extLst>
+            </p:cNvPr>
+            <p:cNvSpPr/>
+            <p:nvPr>
+              <p:extLst>
+                <p:ext uri="{386F3935-93C4-4BCD-93E2-E3B085C9AB24}">
+                  <p16:designElem xmlns:p16="http://schemas.microsoft.com/office/powerpoint/2015/main" val="1"/>
+                </p:ext>
+              </p:extLst>
+            </p:nvPr>
+          </p:nvSpPr>
+          <p:spPr bwMode="auto">
+            <a:xfrm>
+              <a:off x="-1061" y="549842"/>
+              <a:ext cx="10334625" cy="6322075"/>
+            </a:xfrm>
+            <a:custGeom>
+              <a:avLst/>
+              <a:gdLst/>
+              <a:ahLst/>
+              <a:cxnLst/>
+              <a:rect l="0" t="0" r="r" b="b"/>
+              <a:pathLst>
+                <a:path w="2171" h="1326">
+                  <a:moveTo>
+                    <a:pt x="1873" y="1326"/>
+                  </a:moveTo>
+                  <a:cubicBezTo>
+                    <a:pt x="2171" y="1045"/>
+                    <a:pt x="1825" y="678"/>
+                    <a:pt x="1609" y="473"/>
+                  </a:cubicBezTo>
+                  <a:cubicBezTo>
+                    <a:pt x="1406" y="281"/>
+                    <a:pt x="1159" y="116"/>
+                    <a:pt x="880" y="63"/>
+                  </a:cubicBezTo>
+                  <a:cubicBezTo>
+                    <a:pt x="545" y="0"/>
+                    <a:pt x="214" y="161"/>
+                    <a:pt x="0" y="423"/>
+                  </a:cubicBezTo>
+                </a:path>
+              </a:pathLst>
+            </a:custGeom>
+            <a:noFill/>
+            <a:ln w="9525" cap="flat">
+              <a:solidFill>
+                <a:schemeClr val="tx1">
+                  <a:alpha val="35000"/>
+                </a:schemeClr>
+              </a:solidFill>
+              <a:prstDash val="solid"/>
+              <a:miter lim="800000"/>
+              <a:headEnd/>
+              <a:tailEnd/>
+            </a:ln>
+            <a:extLst>
+              <a:ext uri="{909E8E84-426E-40DD-AFC4-6F175D3DCCD1}">
+                <a14:hiddenFill xmlns:a14="http://schemas.microsoft.com/office/drawing/2010/main">
+                  <a:solidFill>
+                    <a:srgbClr val="FFFFFF"/>
+                  </a:solidFill>
+                </a14:hiddenFill>
+              </a:ext>
+            </a:extLst>
+          </p:spPr>
+        </p:sp>
+        <p:sp>
+          <p:nvSpPr>
+            <p:cNvPr id="23" name="Freeform 9">
+              <a:extLst>
+                <a:ext uri="{FF2B5EF4-FFF2-40B4-BE49-F238E27FC236}">
+                  <a16:creationId xmlns:a16="http://schemas.microsoft.com/office/drawing/2014/main" id="{765E127A-B6B7-4B1D-B7BD-6C8C969D29C3}"/>
+                </a:ext>
+                <a:ext uri="{C183D7F6-B498-43B3-948B-1728B52AA6E4}">
+                  <adec:decorative xmlns:adec="http://schemas.microsoft.com/office/drawing/2017/decorative" val="1"/>
+                </a:ext>
+              </a:extLst>
+            </p:cNvPr>
+            <p:cNvSpPr/>
+            <p:nvPr>
+              <p:extLst>
+                <p:ext uri="{386F3935-93C4-4BCD-93E2-E3B085C9AB24}">
+                  <p16:designElem xmlns:p16="http://schemas.microsoft.com/office/powerpoint/2015/main" val="1"/>
+                </p:ext>
+              </p:extLst>
+            </p:nvPr>
+          </p:nvSpPr>
+          <p:spPr bwMode="auto">
+            <a:xfrm>
+              <a:off x="3701" y="6186246"/>
+              <a:ext cx="504825" cy="681527"/>
+            </a:xfrm>
+            <a:custGeom>
+              <a:avLst/>
+              <a:gdLst/>
+              <a:ahLst/>
+              <a:cxnLst/>
+              <a:rect l="0" t="0" r="r" b="b"/>
+              <a:pathLst>
+                <a:path w="106" h="143">
+                  <a:moveTo>
+                    <a:pt x="0" y="0"/>
+                  </a:moveTo>
+                  <a:cubicBezTo>
+                    <a:pt x="35" y="54"/>
+                    <a:pt x="70" y="101"/>
+                    <a:pt x="106" y="143"/>
+                  </a:cubicBezTo>
+                </a:path>
+              </a:pathLst>
+            </a:custGeom>
+            <a:noFill/>
+            <a:ln w="4763" cap="flat">
+              <a:solidFill>
+                <a:schemeClr val="tx1">
+                  <a:alpha val="35000"/>
+                </a:schemeClr>
+              </a:solidFill>
+              <a:prstDash val="solid"/>
+              <a:miter lim="800000"/>
+              <a:headEnd/>
+              <a:tailEnd/>
+            </a:ln>
+            <a:extLst>
+              <a:ext uri="{909E8E84-426E-40DD-AFC4-6F175D3DCCD1}">
+                <a14:hiddenFill xmlns:a14="http://schemas.microsoft.com/office/drawing/2010/main">
+                  <a:solidFill>
+                    <a:srgbClr val="FFFFFF"/>
+                  </a:solidFill>
+                </a14:hiddenFill>
+              </a:ext>
+            </a:extLst>
+          </p:spPr>
+        </p:sp>
+        <p:sp>
+          <p:nvSpPr>
+            <p:cNvPr id="24" name="Freeform 10">
+              <a:extLst>
+                <a:ext uri="{FF2B5EF4-FFF2-40B4-BE49-F238E27FC236}">
+                  <a16:creationId xmlns:a16="http://schemas.microsoft.com/office/drawing/2014/main" id="{3BCA9D9E-C72C-4751-BFA9-10B85CACE3CA}"/>
+                </a:ext>
+                <a:ext uri="{C183D7F6-B498-43B3-948B-1728B52AA6E4}">
+                  <adec:decorative xmlns:adec="http://schemas.microsoft.com/office/drawing/2017/decorative" val="1"/>
+                </a:ext>
+              </a:extLst>
+            </p:cNvPr>
+            <p:cNvSpPr/>
+            <p:nvPr>
+              <p:extLst>
+                <p:ext uri="{386F3935-93C4-4BCD-93E2-E3B085C9AB24}">
+                  <p16:designElem xmlns:p16="http://schemas.microsoft.com/office/powerpoint/2015/main" val="1"/>
+                </p:ext>
+              </p:extLst>
+            </p:nvPr>
+          </p:nvSpPr>
+          <p:spPr bwMode="auto">
+            <a:xfrm>
+              <a:off x="-1061" y="-51881"/>
+              <a:ext cx="11091863" cy="6923796"/>
+            </a:xfrm>
+            <a:custGeom>
+              <a:avLst/>
+              <a:gdLst/>
+              <a:ahLst/>
+              <a:cxnLst/>
+              <a:rect l="0" t="0" r="r" b="b"/>
+              <a:pathLst>
+                <a:path w="2330" h="1452">
+                  <a:moveTo>
+                    <a:pt x="2046" y="1452"/>
+                  </a:moveTo>
+                  <a:cubicBezTo>
+                    <a:pt x="2330" y="1153"/>
+                    <a:pt x="2049" y="821"/>
+                    <a:pt x="1813" y="601"/>
+                  </a:cubicBezTo>
+                  <a:cubicBezTo>
+                    <a:pt x="1569" y="375"/>
+                    <a:pt x="1282" y="179"/>
+                    <a:pt x="956" y="97"/>
+                  </a:cubicBezTo>
+                  <a:cubicBezTo>
+                    <a:pt x="572" y="0"/>
+                    <a:pt x="292" y="101"/>
+                    <a:pt x="0" y="366"/>
+                  </a:cubicBezTo>
+                </a:path>
+              </a:pathLst>
+            </a:custGeom>
+            <a:noFill/>
+            <a:ln w="9525" cap="flat">
+              <a:solidFill>
+                <a:schemeClr val="tx1">
+                  <a:alpha val="35000"/>
+                </a:schemeClr>
+              </a:solidFill>
+              <a:prstDash val="solid"/>
+              <a:miter lim="800000"/>
+              <a:headEnd/>
+              <a:tailEnd/>
+            </a:ln>
+            <a:extLst>
+              <a:ext uri="{909E8E84-426E-40DD-AFC4-6F175D3DCCD1}">
+                <a14:hiddenFill xmlns:a14="http://schemas.microsoft.com/office/drawing/2010/main">
+                  <a:solidFill>
+                    <a:srgbClr val="FFFFFF"/>
+                  </a:solidFill>
+                </a14:hiddenFill>
+              </a:ext>
+            </a:extLst>
+          </p:spPr>
+        </p:sp>
+        <p:sp>
+          <p:nvSpPr>
+            <p:cNvPr id="25" name="Freeform 11">
+              <a:extLst>
+                <a:ext uri="{FF2B5EF4-FFF2-40B4-BE49-F238E27FC236}">
+                  <a16:creationId xmlns:a16="http://schemas.microsoft.com/office/drawing/2014/main" id="{080C708C-69BF-441B-AB75-C98160ED06DE}"/>
+                </a:ext>
+                <a:ext uri="{C183D7F6-B498-43B3-948B-1728B52AA6E4}">
+                  <adec:decorative xmlns:adec="http://schemas.microsoft.com/office/drawing/2017/decorative" val="1"/>
+                </a:ext>
+              </a:extLst>
+            </p:cNvPr>
+            <p:cNvSpPr/>
+            <p:nvPr>
+              <p:extLst>
+                <p:ext uri="{386F3935-93C4-4BCD-93E2-E3B085C9AB24}">
+                  <p16:designElem xmlns:p16="http://schemas.microsoft.com/office/powerpoint/2015/main" val="1"/>
+                </p:ext>
+              </p:extLst>
+            </p:nvPr>
+          </p:nvSpPr>
+          <p:spPr bwMode="auto">
+            <a:xfrm>
+              <a:off x="5426601" y="5579"/>
+              <a:ext cx="5788025" cy="6847184"/>
+            </a:xfrm>
+            <a:custGeom>
+              <a:avLst/>
+              <a:gdLst/>
+              <a:ahLst/>
+              <a:cxnLst/>
+              <a:rect l="0" t="0" r="r" b="b"/>
+              <a:pathLst>
+                <a:path w="1216" h="1436">
+                  <a:moveTo>
+                    <a:pt x="1094" y="1436"/>
+                  </a:moveTo>
+                  <a:cubicBezTo>
+                    <a:pt x="1216" y="1114"/>
+                    <a:pt x="904" y="770"/>
+                    <a:pt x="709" y="551"/>
+                  </a:cubicBezTo>
+                  <a:cubicBezTo>
+                    <a:pt x="509" y="327"/>
+                    <a:pt x="274" y="127"/>
+                    <a:pt x="0" y="0"/>
+                  </a:cubicBezTo>
+                </a:path>
+              </a:pathLst>
+            </a:custGeom>
+            <a:noFill/>
+            <a:ln w="9525" cap="flat">
+              <a:solidFill>
+                <a:schemeClr val="tx1">
+                  <a:alpha val="35000"/>
+                </a:schemeClr>
+              </a:solidFill>
+              <a:prstDash val="solid"/>
+              <a:miter lim="800000"/>
+              <a:headEnd/>
+              <a:tailEnd/>
+            </a:ln>
+            <a:extLst>
+              <a:ext uri="{909E8E84-426E-40DD-AFC4-6F175D3DCCD1}">
+                <a14:hiddenFill xmlns:a14="http://schemas.microsoft.com/office/drawing/2010/main">
+                  <a:solidFill>
+                    <a:srgbClr val="FFFFFF"/>
+                  </a:solidFill>
+                </a14:hiddenFill>
+              </a:ext>
+            </a:extLst>
+          </p:spPr>
+        </p:sp>
+        <p:sp>
+          <p:nvSpPr>
+            <p:cNvPr id="26" name="Freeform 12">
+              <a:extLst>
+                <a:ext uri="{FF2B5EF4-FFF2-40B4-BE49-F238E27FC236}">
+                  <a16:creationId xmlns:a16="http://schemas.microsoft.com/office/drawing/2014/main" id="{3E79964E-F8F1-4763-8892-7BC3DAE306E9}"/>
+                </a:ext>
+                <a:ext uri="{C183D7F6-B498-43B3-948B-1728B52AA6E4}">
+                  <adec:decorative xmlns:adec="http://schemas.microsoft.com/office/drawing/2017/decorative" val="1"/>
+                </a:ext>
+              </a:extLst>
+            </p:cNvPr>
+            <p:cNvSpPr/>
+            <p:nvPr>
+              <p:extLst>
+                <p:ext uri="{386F3935-93C4-4BCD-93E2-E3B085C9AB24}">
+                  <p16:designElem xmlns:p16="http://schemas.microsoft.com/office/powerpoint/2015/main" val="1"/>
+                </p:ext>
+              </p:extLst>
+            </p:nvPr>
+          </p:nvSpPr>
+          <p:spPr bwMode="auto">
+            <a:xfrm>
+              <a:off x="-1061" y="5579"/>
+              <a:ext cx="1057275" cy="614491"/>
+            </a:xfrm>
+            <a:custGeom>
+              <a:avLst/>
+              <a:gdLst/>
+              <a:ahLst/>
+              <a:cxnLst/>
+              <a:rect l="0" t="0" r="r" b="b"/>
+              <a:pathLst>
+                <a:path w="222" h="129">
+                  <a:moveTo>
+                    <a:pt x="222" y="0"/>
+                  </a:moveTo>
+                  <a:cubicBezTo>
+                    <a:pt x="152" y="35"/>
+                    <a:pt x="76" y="78"/>
+                    <a:pt x="0" y="129"/>
+                  </a:cubicBezTo>
+                </a:path>
+              </a:pathLst>
+            </a:custGeom>
+            <a:noFill/>
+            <a:ln w="9525" cap="flat">
+              <a:solidFill>
+                <a:schemeClr val="tx1">
+                  <a:alpha val="35000"/>
+                </a:schemeClr>
+              </a:solidFill>
+              <a:prstDash val="solid"/>
+              <a:miter lim="800000"/>
+              <a:headEnd/>
+              <a:tailEnd/>
+            </a:ln>
+            <a:extLst>
+              <a:ext uri="{909E8E84-426E-40DD-AFC4-6F175D3DCCD1}">
+                <a14:hiddenFill xmlns:a14="http://schemas.microsoft.com/office/drawing/2010/main">
+                  <a:solidFill>
+                    <a:srgbClr val="FFFFFF"/>
+                  </a:solidFill>
+                </a14:hiddenFill>
+              </a:ext>
+            </a:extLst>
+          </p:spPr>
+        </p:sp>
+        <p:sp>
+          <p:nvSpPr>
+            <p:cNvPr id="27" name="Freeform 13">
+              <a:extLst>
+                <a:ext uri="{FF2B5EF4-FFF2-40B4-BE49-F238E27FC236}">
+                  <a16:creationId xmlns:a16="http://schemas.microsoft.com/office/drawing/2014/main" id="{FE09592A-FCC9-4AE5-BA0B-730C6F3BBE95}"/>
+                </a:ext>
+                <a:ext uri="{C183D7F6-B498-43B3-948B-1728B52AA6E4}">
+                  <adec:decorative xmlns:adec="http://schemas.microsoft.com/office/drawing/2017/decorative" val="1"/>
+                </a:ext>
+              </a:extLst>
+            </p:cNvPr>
+            <p:cNvSpPr/>
+            <p:nvPr>
+              <p:extLst>
+                <p:ext uri="{386F3935-93C4-4BCD-93E2-E3B085C9AB24}">
+                  <p16:designElem xmlns:p16="http://schemas.microsoft.com/office/powerpoint/2015/main" val="1"/>
+                </p:ext>
+              </p:extLst>
+            </p:nvPr>
+          </p:nvSpPr>
+          <p:spPr bwMode="auto">
+            <a:xfrm>
+              <a:off x="5821889" y="5579"/>
+              <a:ext cx="5588000" cy="6866337"/>
+            </a:xfrm>
+            <a:custGeom>
+              <a:avLst/>
+              <a:gdLst/>
+              <a:ahLst/>
+              <a:cxnLst/>
+              <a:rect l="0" t="0" r="r" b="b"/>
+              <a:pathLst>
+                <a:path w="1174" h="1440">
+                  <a:moveTo>
+                    <a:pt x="1067" y="1440"/>
+                  </a:moveTo>
+                  <a:cubicBezTo>
+                    <a:pt x="1174" y="1124"/>
+                    <a:pt x="887" y="797"/>
+                    <a:pt x="698" y="577"/>
+                  </a:cubicBezTo>
+                  <a:cubicBezTo>
+                    <a:pt x="500" y="348"/>
+                    <a:pt x="270" y="141"/>
+                    <a:pt x="0" y="0"/>
+                  </a:cubicBezTo>
+                </a:path>
+              </a:pathLst>
+            </a:custGeom>
+            <a:noFill/>
+            <a:ln w="9525" cap="flat">
+              <a:solidFill>
+                <a:schemeClr val="tx1">
+                  <a:alpha val="35000"/>
+                </a:schemeClr>
+              </a:solidFill>
+              <a:prstDash val="dash"/>
+              <a:miter lim="800000"/>
+              <a:headEnd/>
+              <a:tailEnd/>
+            </a:ln>
+            <a:extLst>
+              <a:ext uri="{909E8E84-426E-40DD-AFC4-6F175D3DCCD1}">
+                <a14:hiddenFill xmlns:a14="http://schemas.microsoft.com/office/drawing/2010/main">
+                  <a:solidFill>
+                    <a:srgbClr val="FFFFFF"/>
+                  </a:solidFill>
+                </a14:hiddenFill>
+              </a:ext>
+            </a:extLst>
+          </p:spPr>
+        </p:sp>
+        <p:sp>
+          <p:nvSpPr>
+            <p:cNvPr id="28" name="Freeform 14">
+              <a:extLst>
+                <a:ext uri="{FF2B5EF4-FFF2-40B4-BE49-F238E27FC236}">
+                  <a16:creationId xmlns:a16="http://schemas.microsoft.com/office/drawing/2014/main" id="{96448994-820C-4BC1-ABF3-4579C6F99A63}"/>
+                </a:ext>
+                <a:ext uri="{C183D7F6-B498-43B3-948B-1728B52AA6E4}">
+                  <adec:decorative xmlns:adec="http://schemas.microsoft.com/office/drawing/2017/decorative" val="1"/>
+                </a:ext>
+              </a:extLst>
+            </p:cNvPr>
+            <p:cNvSpPr/>
+            <p:nvPr>
+              <p:extLst>
+                <p:ext uri="{386F3935-93C4-4BCD-93E2-E3B085C9AB24}">
+                  <p16:designElem xmlns:p16="http://schemas.microsoft.com/office/powerpoint/2015/main" val="1"/>
+                </p:ext>
+              </p:extLst>
+            </p:nvPr>
+          </p:nvSpPr>
+          <p:spPr bwMode="auto">
+            <a:xfrm>
+              <a:off x="3701" y="790"/>
+              <a:ext cx="595313" cy="352734"/>
+            </a:xfrm>
+            <a:custGeom>
+              <a:avLst/>
+              <a:gdLst/>
+              <a:ahLst/>
+              <a:cxnLst/>
+              <a:rect l="0" t="0" r="r" b="b"/>
+              <a:pathLst>
+                <a:path w="125" h="74">
+                  <a:moveTo>
+                    <a:pt x="125" y="0"/>
+                  </a:moveTo>
+                  <a:cubicBezTo>
+                    <a:pt x="85" y="22"/>
+                    <a:pt x="43" y="47"/>
+                    <a:pt x="0" y="74"/>
+                  </a:cubicBezTo>
+                </a:path>
+              </a:pathLst>
+            </a:custGeom>
+            <a:noFill/>
+            <a:ln w="9525" cap="flat">
+              <a:solidFill>
+                <a:schemeClr val="tx1">
+                  <a:alpha val="35000"/>
+                </a:schemeClr>
+              </a:solidFill>
+              <a:prstDash val="dash"/>
+              <a:miter lim="800000"/>
+              <a:headEnd/>
+              <a:tailEnd/>
+            </a:ln>
+            <a:extLst>
+              <a:ext uri="{909E8E84-426E-40DD-AFC4-6F175D3DCCD1}">
+                <a14:hiddenFill xmlns:a14="http://schemas.microsoft.com/office/drawing/2010/main">
+                  <a:solidFill>
+                    <a:srgbClr val="FFFFFF"/>
+                  </a:solidFill>
+                </a14:hiddenFill>
+              </a:ext>
+            </a:extLst>
+          </p:spPr>
+        </p:sp>
+        <p:sp>
+          <p:nvSpPr>
+            <p:cNvPr id="29" name="Freeform 15">
+              <a:extLst>
+                <a:ext uri="{FF2B5EF4-FFF2-40B4-BE49-F238E27FC236}">
+                  <a16:creationId xmlns:a16="http://schemas.microsoft.com/office/drawing/2014/main" id="{9BB0D192-565A-42B9-B292-CC032D71A6A1}"/>
+                </a:ext>
+                <a:ext uri="{C183D7F6-B498-43B3-948B-1728B52AA6E4}">
+                  <adec:decorative xmlns:adec="http://schemas.microsoft.com/office/drawing/2017/decorative" val="1"/>
+                </a:ext>
+              </a:extLst>
+            </p:cNvPr>
+            <p:cNvSpPr/>
+            <p:nvPr>
+              <p:extLst>
+                <p:ext uri="{386F3935-93C4-4BCD-93E2-E3B085C9AB24}">
+                  <p16:designElem xmlns:p16="http://schemas.microsoft.com/office/powerpoint/2015/main" val="1"/>
+                </p:ext>
+              </p:extLst>
+            </p:nvPr>
+          </p:nvSpPr>
+          <p:spPr bwMode="auto">
+            <a:xfrm>
+              <a:off x="6012389" y="5579"/>
+              <a:ext cx="5497513" cy="6866337"/>
+            </a:xfrm>
+            <a:custGeom>
+              <a:avLst/>
+              <a:gdLst/>
+              <a:ahLst/>
+              <a:cxnLst/>
+              <a:rect l="0" t="0" r="r" b="b"/>
+              <a:pathLst>
+                <a:path w="1155" h="1440">
+                  <a:moveTo>
+                    <a:pt x="1056" y="1440"/>
+                  </a:moveTo>
+                  <a:cubicBezTo>
+                    <a:pt x="1155" y="1123"/>
+                    <a:pt x="875" y="801"/>
+                    <a:pt x="686" y="580"/>
+                  </a:cubicBezTo>
+                  <a:cubicBezTo>
+                    <a:pt x="491" y="352"/>
+                    <a:pt x="264" y="145"/>
+                    <a:pt x="0" y="0"/>
+                  </a:cubicBezTo>
+                </a:path>
+              </a:pathLst>
+            </a:custGeom>
+            <a:noFill/>
+            <a:ln w="12700" cap="flat">
+              <a:solidFill>
+                <a:schemeClr val="tx1">
+                  <a:alpha val="35000"/>
+                </a:schemeClr>
+              </a:solidFill>
+              <a:prstDash val="dashDot"/>
+              <a:miter lim="800000"/>
+              <a:headEnd/>
+              <a:tailEnd/>
+            </a:ln>
+            <a:extLst>
+              <a:ext uri="{909E8E84-426E-40DD-AFC4-6F175D3DCCD1}">
+                <a14:hiddenFill xmlns:a14="http://schemas.microsoft.com/office/drawing/2010/main">
+                  <a:solidFill>
+                    <a:srgbClr val="FFFFFF"/>
+                  </a:solidFill>
+                </a14:hiddenFill>
+              </a:ext>
+            </a:extLst>
+          </p:spPr>
+        </p:sp>
+        <p:sp>
+          <p:nvSpPr>
+            <p:cNvPr id="30" name="Freeform 16">
+              <a:extLst>
+                <a:ext uri="{FF2B5EF4-FFF2-40B4-BE49-F238E27FC236}">
+                  <a16:creationId xmlns:a16="http://schemas.microsoft.com/office/drawing/2014/main" id="{6D1CA09C-5F40-4E92-A7E9-D1FCEE51283D}"/>
+                </a:ext>
+                <a:ext uri="{C183D7F6-B498-43B3-948B-1728B52AA6E4}">
+                  <adec:decorative xmlns:adec="http://schemas.microsoft.com/office/drawing/2017/decorative" val="1"/>
+                </a:ext>
+              </a:extLst>
+            </p:cNvPr>
+            <p:cNvSpPr/>
+            <p:nvPr>
+              <p:extLst>
+                <p:ext uri="{386F3935-93C4-4BCD-93E2-E3B085C9AB24}">
+                  <p16:designElem xmlns:p16="http://schemas.microsoft.com/office/powerpoint/2015/main" val="1"/>
+                </p:ext>
+              </p:extLst>
+            </p:nvPr>
+          </p:nvSpPr>
+          <p:spPr bwMode="auto">
+            <a:xfrm>
+              <a:off x="-1061" y="5579"/>
+              <a:ext cx="357188" cy="213875"/>
+            </a:xfrm>
+            <a:custGeom>
+              <a:avLst/>
+              <a:gdLst/>
+              <a:ahLst/>
+              <a:cxnLst/>
+              <a:rect l="0" t="0" r="r" b="b"/>
+              <a:pathLst>
+                <a:path w="75" h="45">
+                  <a:moveTo>
+                    <a:pt x="75" y="0"/>
+                  </a:moveTo>
+                  <a:cubicBezTo>
+                    <a:pt x="50" y="14"/>
+                    <a:pt x="25" y="29"/>
+                    <a:pt x="0" y="45"/>
+                  </a:cubicBezTo>
+                </a:path>
+              </a:pathLst>
+            </a:custGeom>
+            <a:noFill/>
+            <a:ln w="12700" cap="flat">
+              <a:solidFill>
+                <a:schemeClr val="tx1">
+                  <a:alpha val="35000"/>
+                </a:schemeClr>
+              </a:solidFill>
+              <a:prstDash val="dashDot"/>
+              <a:miter lim="800000"/>
+              <a:headEnd/>
+              <a:tailEnd/>
+            </a:ln>
+            <a:extLst>
+              <a:ext uri="{909E8E84-426E-40DD-AFC4-6F175D3DCCD1}">
+                <a14:hiddenFill xmlns:a14="http://schemas.microsoft.com/office/drawing/2010/main">
+                  <a:solidFill>
+                    <a:srgbClr val="FFFFFF"/>
+                  </a:solidFill>
+                </a14:hiddenFill>
+              </a:ext>
+            </a:extLst>
+          </p:spPr>
+        </p:sp>
+        <p:sp>
+          <p:nvSpPr>
+            <p:cNvPr id="31" name="Freeform 17">
+              <a:extLst>
+                <a:ext uri="{FF2B5EF4-FFF2-40B4-BE49-F238E27FC236}">
+                  <a16:creationId xmlns:a16="http://schemas.microsoft.com/office/drawing/2014/main" id="{379F5AA5-2E14-4880-A5A6-07AEF2AD89DB}"/>
+                </a:ext>
+                <a:ext uri="{C183D7F6-B498-43B3-948B-1728B52AA6E4}">
+                  <adec:decorative xmlns:adec="http://schemas.microsoft.com/office/drawing/2017/decorative" val="1"/>
+                </a:ext>
+              </a:extLst>
+            </p:cNvPr>
+            <p:cNvSpPr/>
+            <p:nvPr>
+              <p:extLst>
+                <p:ext uri="{386F3935-93C4-4BCD-93E2-E3B085C9AB24}">
+                  <p16:designElem xmlns:p16="http://schemas.microsoft.com/office/powerpoint/2015/main" val="1"/>
+                </p:ext>
+              </p:extLst>
+            </p:nvPr>
+          </p:nvSpPr>
+          <p:spPr bwMode="auto">
+            <a:xfrm>
+              <a:off x="6210826" y="790"/>
+              <a:ext cx="5522913" cy="6871126"/>
+            </a:xfrm>
+            <a:custGeom>
+              <a:avLst/>
+              <a:gdLst/>
+              <a:ahLst/>
+              <a:cxnLst/>
+              <a:rect l="0" t="0" r="r" b="b"/>
+              <a:pathLst>
+                <a:path w="1160" h="1441">
+                  <a:moveTo>
+                    <a:pt x="1053" y="1441"/>
+                  </a:moveTo>
+                  <a:cubicBezTo>
+                    <a:pt x="1160" y="1129"/>
+                    <a:pt x="892" y="817"/>
+                    <a:pt x="705" y="599"/>
+                  </a:cubicBezTo>
+                  <a:cubicBezTo>
+                    <a:pt x="503" y="365"/>
+                    <a:pt x="270" y="152"/>
+                    <a:pt x="0" y="0"/>
+                  </a:cubicBezTo>
+                </a:path>
+              </a:pathLst>
+            </a:custGeom>
+            <a:noFill/>
+            <a:ln w="9525" cap="flat">
+              <a:solidFill>
+                <a:schemeClr val="tx1">
+                  <a:alpha val="35000"/>
+                </a:schemeClr>
+              </a:solidFill>
+              <a:prstDash val="solid"/>
+              <a:miter lim="800000"/>
+              <a:headEnd/>
+              <a:tailEnd/>
+            </a:ln>
+            <a:extLst>
+              <a:ext uri="{909E8E84-426E-40DD-AFC4-6F175D3DCCD1}">
+                <a14:hiddenFill xmlns:a14="http://schemas.microsoft.com/office/drawing/2010/main">
+                  <a:solidFill>
+                    <a:srgbClr val="FFFFFF"/>
+                  </a:solidFill>
+                </a14:hiddenFill>
+              </a:ext>
+            </a:extLst>
+          </p:spPr>
+        </p:sp>
+        <p:sp>
+          <p:nvSpPr>
+            <p:cNvPr id="32" name="Freeform 18">
+              <a:extLst>
+                <a:ext uri="{FF2B5EF4-FFF2-40B4-BE49-F238E27FC236}">
+                  <a16:creationId xmlns:a16="http://schemas.microsoft.com/office/drawing/2014/main" id="{EF14BD32-D239-4DA3-98B3-7752073657CC}"/>
+                </a:ext>
+                <a:ext uri="{C183D7F6-B498-43B3-948B-1728B52AA6E4}">
+                  <adec:decorative xmlns:adec="http://schemas.microsoft.com/office/drawing/2017/decorative" val="1"/>
+                </a:ext>
+              </a:extLst>
+            </p:cNvPr>
+            <p:cNvSpPr/>
+            <p:nvPr>
+              <p:extLst>
+                <p:ext uri="{386F3935-93C4-4BCD-93E2-E3B085C9AB24}">
+                  <p16:designElem xmlns:p16="http://schemas.microsoft.com/office/powerpoint/2015/main" val="1"/>
+                </p:ext>
+              </p:extLst>
+            </p:nvPr>
+          </p:nvSpPr>
+          <p:spPr bwMode="auto">
+            <a:xfrm>
+              <a:off x="6463239" y="5579"/>
+              <a:ext cx="5413375" cy="6866337"/>
+            </a:xfrm>
+            <a:custGeom>
+              <a:avLst/>
+              <a:gdLst/>
+              <a:ahLst/>
+              <a:cxnLst/>
+              <a:rect l="0" t="0" r="r" b="b"/>
+              <a:pathLst>
+                <a:path w="1137" h="1440">
+                  <a:moveTo>
+                    <a:pt x="1040" y="1440"/>
+                  </a:moveTo>
+                  <a:cubicBezTo>
+                    <a:pt x="1137" y="1131"/>
+                    <a:pt x="883" y="828"/>
+                    <a:pt x="698" y="611"/>
+                  </a:cubicBezTo>
+                  <a:cubicBezTo>
+                    <a:pt x="498" y="375"/>
+                    <a:pt x="268" y="159"/>
+                    <a:pt x="0" y="0"/>
+                  </a:cubicBezTo>
+                </a:path>
+              </a:pathLst>
+            </a:custGeom>
+            <a:noFill/>
+            <a:ln w="9525" cap="flat">
+              <a:solidFill>
+                <a:schemeClr val="tx1">
+                  <a:alpha val="35000"/>
+                </a:schemeClr>
+              </a:solidFill>
+              <a:prstDash val="solid"/>
+              <a:miter lim="800000"/>
+              <a:headEnd/>
+              <a:tailEnd/>
+            </a:ln>
+            <a:extLst>
+              <a:ext uri="{909E8E84-426E-40DD-AFC4-6F175D3DCCD1}">
+                <a14:hiddenFill xmlns:a14="http://schemas.microsoft.com/office/drawing/2010/main">
+                  <a:solidFill>
+                    <a:srgbClr val="FFFFFF"/>
+                  </a:solidFill>
+                </a14:hiddenFill>
+              </a:ext>
+            </a:extLst>
+          </p:spPr>
+        </p:sp>
+        <p:sp>
+          <p:nvSpPr>
+            <p:cNvPr id="33" name="Freeform 19">
+              <a:extLst>
+                <a:ext uri="{FF2B5EF4-FFF2-40B4-BE49-F238E27FC236}">
+                  <a16:creationId xmlns:a16="http://schemas.microsoft.com/office/drawing/2014/main" id="{CF07B250-E5E4-4624-9BD7-8D513A67B731}"/>
+                </a:ext>
+                <a:ext uri="{C183D7F6-B498-43B3-948B-1728B52AA6E4}">
+                  <adec:decorative xmlns:adec="http://schemas.microsoft.com/office/drawing/2017/decorative" val="1"/>
+                </a:ext>
+              </a:extLst>
+            </p:cNvPr>
+            <p:cNvSpPr/>
+            <p:nvPr>
+              <p:extLst>
+                <p:ext uri="{386F3935-93C4-4BCD-93E2-E3B085C9AB24}">
+                  <p16:designElem xmlns:p16="http://schemas.microsoft.com/office/powerpoint/2015/main" val="1"/>
+                </p:ext>
+              </p:extLst>
+            </p:nvPr>
+          </p:nvSpPr>
+          <p:spPr bwMode="auto">
+            <a:xfrm>
+              <a:off x="6877576" y="5579"/>
+              <a:ext cx="5037138" cy="6861550"/>
+            </a:xfrm>
+            <a:custGeom>
+              <a:avLst/>
+              <a:gdLst/>
+              <a:ahLst/>
+              <a:cxnLst/>
+              <a:rect l="0" t="0" r="r" b="b"/>
+              <a:pathLst>
+                <a:path w="1058" h="1439">
+                  <a:moveTo>
+                    <a:pt x="1011" y="1439"/>
+                  </a:moveTo>
+                  <a:cubicBezTo>
+                    <a:pt x="1058" y="1131"/>
+                    <a:pt x="825" y="841"/>
+                    <a:pt x="648" y="617"/>
+                  </a:cubicBezTo>
+                  <a:cubicBezTo>
+                    <a:pt x="462" y="383"/>
+                    <a:pt x="248" y="168"/>
+                    <a:pt x="0" y="0"/>
+                  </a:cubicBezTo>
+                </a:path>
+              </a:pathLst>
+            </a:custGeom>
+            <a:noFill/>
+            <a:ln w="9525" cap="flat">
+              <a:solidFill>
+                <a:schemeClr val="tx1">
+                  <a:alpha val="35000"/>
+                </a:schemeClr>
+              </a:solidFill>
+              <a:prstDash val="solid"/>
+              <a:miter lim="800000"/>
+              <a:headEnd/>
+              <a:tailEnd/>
+            </a:ln>
+            <a:extLst>
+              <a:ext uri="{909E8E84-426E-40DD-AFC4-6F175D3DCCD1}">
+                <a14:hiddenFill xmlns:a14="http://schemas.microsoft.com/office/drawing/2010/main">
+                  <a:solidFill>
+                    <a:srgbClr val="FFFFFF"/>
+                  </a:solidFill>
+                </a14:hiddenFill>
+              </a:ext>
+            </a:extLst>
+          </p:spPr>
+        </p:sp>
+        <p:sp>
+          <p:nvSpPr>
+            <p:cNvPr id="34" name="Freeform 20">
+              <a:extLst>
+                <a:ext uri="{FF2B5EF4-FFF2-40B4-BE49-F238E27FC236}">
+                  <a16:creationId xmlns:a16="http://schemas.microsoft.com/office/drawing/2014/main" id="{BCC5D120-7C8C-4290-865C-4EE6E4F245F9}"/>
+                </a:ext>
+                <a:ext uri="{C183D7F6-B498-43B3-948B-1728B52AA6E4}">
+                  <adec:decorative xmlns:adec="http://schemas.microsoft.com/office/drawing/2017/decorative" val="1"/>
+                </a:ext>
+              </a:extLst>
+            </p:cNvPr>
+            <p:cNvSpPr/>
+            <p:nvPr>
+              <p:extLst>
+                <p:ext uri="{386F3935-93C4-4BCD-93E2-E3B085C9AB24}">
+                  <p16:designElem xmlns:p16="http://schemas.microsoft.com/office/powerpoint/2015/main" val="1"/>
+                </p:ext>
+              </p:extLst>
+            </p:nvPr>
+          </p:nvSpPr>
+          <p:spPr bwMode="auto">
+            <a:xfrm>
+              <a:off x="8768289" y="5579"/>
+              <a:ext cx="3417888" cy="2742066"/>
+            </a:xfrm>
+            <a:custGeom>
+              <a:avLst/>
+              <a:gdLst/>
+              <a:ahLst/>
+              <a:cxnLst/>
+              <a:rect l="0" t="0" r="r" b="b"/>
+              <a:pathLst>
+                <a:path w="718" h="575">
+                  <a:moveTo>
+                    <a:pt x="718" y="575"/>
+                  </a:moveTo>
+                  <a:cubicBezTo>
+                    <a:pt x="500" y="360"/>
+                    <a:pt x="260" y="163"/>
+                    <a:pt x="0" y="0"/>
+                  </a:cubicBezTo>
+                </a:path>
+              </a:pathLst>
+            </a:custGeom>
+            <a:noFill/>
+            <a:ln w="9525" cap="flat">
+              <a:solidFill>
+                <a:schemeClr val="tx1">
+                  <a:alpha val="35000"/>
+                </a:schemeClr>
+              </a:solidFill>
+              <a:prstDash val="solid"/>
+              <a:miter lim="800000"/>
+              <a:headEnd/>
+              <a:tailEnd/>
+            </a:ln>
+            <a:extLst>
+              <a:ext uri="{909E8E84-426E-40DD-AFC4-6F175D3DCCD1}">
+                <a14:hiddenFill xmlns:a14="http://schemas.microsoft.com/office/drawing/2010/main">
+                  <a:solidFill>
+                    <a:srgbClr val="FFFFFF"/>
+                  </a:solidFill>
+                </a14:hiddenFill>
+              </a:ext>
+            </a:extLst>
+          </p:spPr>
+        </p:sp>
+        <p:sp>
+          <p:nvSpPr>
+            <p:cNvPr id="35" name="Freeform 21">
+              <a:extLst>
+                <a:ext uri="{FF2B5EF4-FFF2-40B4-BE49-F238E27FC236}">
+                  <a16:creationId xmlns:a16="http://schemas.microsoft.com/office/drawing/2014/main" id="{C24688C6-CAE5-4EF2-B2BA-A138DA0A24B9}"/>
+                </a:ext>
+                <a:ext uri="{C183D7F6-B498-43B3-948B-1728B52AA6E4}">
+                  <adec:decorative xmlns:adec="http://schemas.microsoft.com/office/drawing/2017/decorative" val="1"/>
+                </a:ext>
+              </a:extLst>
+            </p:cNvPr>
+            <p:cNvSpPr/>
+            <p:nvPr>
+              <p:extLst>
+                <p:ext uri="{386F3935-93C4-4BCD-93E2-E3B085C9AB24}">
+                  <p16:designElem xmlns:p16="http://schemas.microsoft.com/office/powerpoint/2015/main" val="1"/>
+                </p:ext>
+              </p:extLst>
+            </p:nvPr>
+          </p:nvSpPr>
+          <p:spPr bwMode="auto">
+            <a:xfrm>
+              <a:off x="9235014" y="10367"/>
+              <a:ext cx="2951163" cy="2555325"/>
+            </a:xfrm>
+            <a:custGeom>
+              <a:avLst/>
+              <a:gdLst/>
+              <a:ahLst/>
+              <a:cxnLst/>
+              <a:rect l="0" t="0" r="r" b="b"/>
+              <a:pathLst>
+                <a:path w="620" h="536">
+                  <a:moveTo>
+                    <a:pt x="620" y="536"/>
+                  </a:moveTo>
+                  <a:cubicBezTo>
+                    <a:pt x="404" y="314"/>
+                    <a:pt x="196" y="138"/>
+                    <a:pt x="0" y="0"/>
+                  </a:cubicBezTo>
+                </a:path>
+              </a:pathLst>
+            </a:custGeom>
+            <a:noFill/>
+            <a:ln w="9525" cap="flat">
+              <a:solidFill>
+                <a:schemeClr val="tx1">
+                  <a:alpha val="35000"/>
+                </a:schemeClr>
+              </a:solidFill>
+              <a:prstDash val="solid"/>
+              <a:miter lim="800000"/>
+              <a:headEnd/>
+              <a:tailEnd/>
+            </a:ln>
+            <a:extLst>
+              <a:ext uri="{909E8E84-426E-40DD-AFC4-6F175D3DCCD1}">
+                <a14:hiddenFill xmlns:a14="http://schemas.microsoft.com/office/drawing/2010/main">
+                  <a:solidFill>
+                    <a:srgbClr val="FFFFFF"/>
+                  </a:solidFill>
+                </a14:hiddenFill>
+              </a:ext>
+            </a:extLst>
+          </p:spPr>
+        </p:sp>
+        <p:sp>
+          <p:nvSpPr>
+            <p:cNvPr id="36" name="Freeform 22">
+              <a:extLst>
+                <a:ext uri="{FF2B5EF4-FFF2-40B4-BE49-F238E27FC236}">
+                  <a16:creationId xmlns:a16="http://schemas.microsoft.com/office/drawing/2014/main" id="{6BD31099-7C13-4901-A04F-632B1CD84627}"/>
+                </a:ext>
+                <a:ext uri="{C183D7F6-B498-43B3-948B-1728B52AA6E4}">
+                  <adec:decorative xmlns:adec="http://schemas.microsoft.com/office/drawing/2017/decorative" val="1"/>
+                </a:ext>
+              </a:extLst>
+            </p:cNvPr>
+            <p:cNvSpPr/>
+            <p:nvPr>
+              <p:extLst>
+                <p:ext uri="{386F3935-93C4-4BCD-93E2-E3B085C9AB24}">
+                  <p16:designElem xmlns:p16="http://schemas.microsoft.com/office/powerpoint/2015/main" val="1"/>
+                </p:ext>
+              </p:extLst>
+            </p:nvPr>
+          </p:nvSpPr>
+          <p:spPr bwMode="auto">
+            <a:xfrm>
+              <a:off x="10020826" y="5579"/>
+              <a:ext cx="2165350" cy="1358265"/>
+            </a:xfrm>
+            <a:custGeom>
+              <a:avLst/>
+              <a:gdLst/>
+              <a:ahLst/>
+              <a:cxnLst/>
+              <a:rect l="0" t="0" r="r" b="b"/>
+              <a:pathLst>
+                <a:path w="455" h="285">
+                  <a:moveTo>
+                    <a:pt x="0" y="0"/>
+                  </a:moveTo>
+                  <a:cubicBezTo>
+                    <a:pt x="153" y="85"/>
+                    <a:pt x="308" y="180"/>
+                    <a:pt x="455" y="285"/>
+                  </a:cubicBezTo>
+                </a:path>
+              </a:pathLst>
+            </a:custGeom>
+            <a:noFill/>
+            <a:ln w="9525" cap="flat">
+              <a:solidFill>
+                <a:schemeClr val="tx1">
+                  <a:alpha val="35000"/>
+                </a:schemeClr>
+              </a:solidFill>
+              <a:prstDash val="dash"/>
+              <a:miter lim="800000"/>
+              <a:headEnd/>
+              <a:tailEnd/>
+            </a:ln>
+            <a:extLst>
+              <a:ext uri="{909E8E84-426E-40DD-AFC4-6F175D3DCCD1}">
+                <a14:hiddenFill xmlns:a14="http://schemas.microsoft.com/office/drawing/2010/main">
+                  <a:solidFill>
+                    <a:srgbClr val="FFFFFF"/>
+                  </a:solidFill>
+                </a14:hiddenFill>
+              </a:ext>
+            </a:extLst>
+          </p:spPr>
+        </p:sp>
+        <p:sp>
+          <p:nvSpPr>
+            <p:cNvPr id="37" name="Freeform 23">
+              <a:extLst>
+                <a:ext uri="{FF2B5EF4-FFF2-40B4-BE49-F238E27FC236}">
+                  <a16:creationId xmlns:a16="http://schemas.microsoft.com/office/drawing/2014/main" id="{679F5FF7-82B2-4033-8FBE-63170C937833}"/>
+                </a:ext>
+                <a:ext uri="{C183D7F6-B498-43B3-948B-1728B52AA6E4}">
+                  <adec:decorative xmlns:adec="http://schemas.microsoft.com/office/drawing/2017/decorative" val="1"/>
+                </a:ext>
+              </a:extLst>
+            </p:cNvPr>
+            <p:cNvSpPr/>
+            <p:nvPr>
+              <p:extLst>
+                <p:ext uri="{386F3935-93C4-4BCD-93E2-E3B085C9AB24}">
+                  <p16:designElem xmlns:p16="http://schemas.microsoft.com/office/powerpoint/2015/main" val="1"/>
+                </p:ext>
+              </p:extLst>
+            </p:nvPr>
+          </p:nvSpPr>
+          <p:spPr bwMode="auto">
+            <a:xfrm>
+              <a:off x="11290826" y="5579"/>
+              <a:ext cx="895350" cy="534687"/>
+            </a:xfrm>
+            <a:custGeom>
+              <a:avLst/>
+              <a:gdLst/>
+              <a:ahLst/>
+              <a:cxnLst/>
+              <a:rect l="0" t="0" r="r" b="b"/>
+              <a:pathLst>
+                <a:path w="188" h="112">
+                  <a:moveTo>
+                    <a:pt x="0" y="0"/>
+                  </a:moveTo>
+                  <a:cubicBezTo>
+                    <a:pt x="63" y="36"/>
+                    <a:pt x="126" y="73"/>
+                    <a:pt x="188" y="112"/>
+                  </a:cubicBezTo>
+                </a:path>
+              </a:pathLst>
+            </a:custGeom>
+            <a:noFill/>
+            <a:ln w="9525" cap="flat">
+              <a:solidFill>
+                <a:schemeClr val="tx1">
+                  <a:alpha val="35000"/>
+                </a:schemeClr>
+              </a:solidFill>
+              <a:prstDash val="solid"/>
+              <a:miter lim="800000"/>
+              <a:headEnd/>
+              <a:tailEnd/>
+            </a:ln>
+            <a:extLst>
+              <a:ext uri="{909E8E84-426E-40DD-AFC4-6F175D3DCCD1}">
+                <a14:hiddenFill xmlns:a14="http://schemas.microsoft.com/office/drawing/2010/main">
+                  <a:solidFill>
+                    <a:srgbClr val="FFFFFF"/>
+                  </a:solidFill>
+                </a14:hiddenFill>
+              </a:ext>
+            </a:extLst>
+          </p:spPr>
+        </p:sp>
+      </p:grpSp>
+      <p:sp>
+        <p:nvSpPr>
           <p:cNvPr id="2" name="Title 1">
             <a:extLst>
               <a:ext uri="{FF2B5EF4-FFF2-40B4-BE49-F238E27FC236}">
-                <a16:creationId xmlns:a16="http://schemas.microsoft.com/office/drawing/2014/main" id="{5A8FC253-2873-49FC-8B13-A2D154ABC527}"/>
+                <a16:creationId xmlns:a16="http://schemas.microsoft.com/office/drawing/2014/main" id="{1C8B412F-74FC-436C-AE0E-564C94C07428}"/>
               </a:ext>
             </a:extLst>
           </p:cNvPr>
@@ -23548,34 +25043,311 @@
             <p:ph type="title"/>
           </p:nvPr>
         </p:nvSpPr>
-        <p:spPr/>
+        <p:spPr>
+          <a:xfrm>
+            <a:off x="888631" y="4760132"/>
+            <a:ext cx="3947420" cy="1777829"/>
+          </a:xfrm>
+        </p:spPr>
         <p:txBody>
           <a:bodyPr>
-            <a:normAutofit fontScale="90000"/>
+            <a:normAutofit/>
           </a:bodyPr>
           <a:lstStyle/>
           <a:p>
+            <a:pPr algn="l"/>
             <a:r>
-              <a:rPr lang="en-US" dirty="0"/>
-              <a:t>Performance evaluated on test set:</a:t>
+              <a:rPr lang="en-GB" sz="3100" dirty="0">
+                <a:solidFill>
+                  <a:schemeClr val="tx1"/>
+                </a:solidFill>
+              </a:rPr>
+              <a:t>Basic CNN</a:t>
             </a:r>
             <a:br>
-              <a:rPr lang="en-US" dirty="0"/>
+              <a:rPr lang="en-GB" sz="3100" dirty="0">
+                <a:solidFill>
+                  <a:schemeClr val="tx1"/>
+                </a:solidFill>
+              </a:rPr>
             </a:br>
             <a:r>
-              <a:rPr lang="en-GB" sz="4900" b="1" dirty="0"/>
-              <a:t>CNN </a:t>
+              <a:rPr lang="en-GB" sz="3100" dirty="0">
+                <a:solidFill>
+                  <a:schemeClr val="tx1"/>
+                </a:solidFill>
+              </a:rPr>
+              <a:t>30 epochs</a:t>
             </a:r>
-            <a:endParaRPr lang="en-GB" dirty="0"/>
+            <a:br>
+              <a:rPr lang="en-GB" sz="3100" dirty="0">
+                <a:solidFill>
+                  <a:schemeClr val="tx1"/>
+                </a:solidFill>
+              </a:rPr>
+            </a:br>
+            <a:r>
+              <a:rPr lang="en-GB" sz="3100" dirty="0">
+                <a:solidFill>
+                  <a:schemeClr val="tx1"/>
+                </a:solidFill>
+              </a:rPr>
+              <a:t> </a:t>
+            </a:r>
+            <a:r>
+              <a:rPr lang="en-GB" sz="3100" dirty="0" err="1">
+                <a:solidFill>
+                  <a:schemeClr val="tx1"/>
+                </a:solidFill>
+              </a:rPr>
+              <a:t>lr</a:t>
+            </a:r>
+            <a:r>
+              <a:rPr lang="en-GB" sz="3100" dirty="0">
+                <a:solidFill>
+                  <a:schemeClr val="tx1"/>
+                </a:solidFill>
+              </a:rPr>
+              <a:t> =0.01</a:t>
+            </a:r>
           </a:p>
         </p:txBody>
       </p:sp>
       <p:sp>
         <p:nvSpPr>
-          <p:cNvPr id="3" name="Content Placeholder 2">
+          <p:cNvPr id="39" name="Freeform: Shape 38">
             <a:extLst>
               <a:ext uri="{FF2B5EF4-FFF2-40B4-BE49-F238E27FC236}">
-                <a16:creationId xmlns:a16="http://schemas.microsoft.com/office/drawing/2014/main" id="{A3329EB9-5A03-4BDD-BB23-DD8621FE69CD}"/>
+                <a16:creationId xmlns:a16="http://schemas.microsoft.com/office/drawing/2014/main" id="{44C110BA-81E8-4247-853A-5F2B93E92E46}"/>
+              </a:ext>
+              <a:ext uri="{C183D7F6-B498-43B3-948B-1728B52AA6E4}">
+                <adec:decorative xmlns:adec="http://schemas.microsoft.com/office/drawing/2017/decorative" val="1"/>
+              </a:ext>
+            </a:extLst>
+          </p:cNvPr>
+          <p:cNvSpPr>
+            <a:spLocks noGrp="1" noRot="1" noChangeAspect="1" noMove="1" noResize="1" noEditPoints="1" noAdjustHandles="1" noChangeArrowheads="1" noChangeShapeType="1" noTextEdit="1"/>
+          </p:cNvSpPr>
+          <p:nvPr>
+            <p:extLst>
+              <p:ext uri="{386F3935-93C4-4BCD-93E2-E3B085C9AB24}">
+                <p16:designElem xmlns:p16="http://schemas.microsoft.com/office/powerpoint/2015/main" val="1"/>
+              </p:ext>
+            </p:extLst>
+          </p:nvPr>
+        </p:nvSpPr>
+        <p:spPr>
+          <a:xfrm>
+            <a:off x="0" y="0"/>
+            <a:ext cx="12192000" cy="4537825"/>
+          </a:xfrm>
+          <a:custGeom>
+            <a:avLst/>
+            <a:gdLst>
+              <a:gd name="connsiteX0" fmla="*/ 0 w 12192000"/>
+              <a:gd name="connsiteY0" fmla="*/ 0 h 4537825"/>
+              <a:gd name="connsiteX1" fmla="*/ 12192000 w 12192000"/>
+              <a:gd name="connsiteY1" fmla="*/ 0 h 4537825"/>
+              <a:gd name="connsiteX2" fmla="*/ 12192000 w 12192000"/>
+              <a:gd name="connsiteY2" fmla="*/ 3020937 h 4537825"/>
+              <a:gd name="connsiteX3" fmla="*/ 12192000 w 12192000"/>
+              <a:gd name="connsiteY3" fmla="*/ 3213062 h 4537825"/>
+              <a:gd name="connsiteX4" fmla="*/ 12192000 w 12192000"/>
+              <a:gd name="connsiteY4" fmla="*/ 4188880 h 4537825"/>
+              <a:gd name="connsiteX5" fmla="*/ 12113803 w 12192000"/>
+              <a:gd name="connsiteY5" fmla="*/ 4197163 h 4537825"/>
+              <a:gd name="connsiteX6" fmla="*/ 6753597 w 12192000"/>
+              <a:gd name="connsiteY6" fmla="*/ 4520720 h 4537825"/>
+              <a:gd name="connsiteX7" fmla="*/ 400746 w 12192000"/>
+              <a:gd name="connsiteY7" fmla="*/ 4349377 h 4537825"/>
+              <a:gd name="connsiteX8" fmla="*/ 0 w 12192000"/>
+              <a:gd name="connsiteY8" fmla="*/ 4312401 h 4537825"/>
+              <a:gd name="connsiteX9" fmla="*/ 0 w 12192000"/>
+              <a:gd name="connsiteY9" fmla="*/ 3213062 h 4537825"/>
+              <a:gd name="connsiteX10" fmla="*/ 0 w 12192000"/>
+              <a:gd name="connsiteY10" fmla="*/ 3020937 h 4537825"/>
+            </a:gdLst>
+            <a:ahLst/>
+            <a:cxnLst>
+              <a:cxn ang="0">
+                <a:pos x="connsiteX0" y="connsiteY0"/>
+              </a:cxn>
+              <a:cxn ang="0">
+                <a:pos x="connsiteX1" y="connsiteY1"/>
+              </a:cxn>
+              <a:cxn ang="0">
+                <a:pos x="connsiteX2" y="connsiteY2"/>
+              </a:cxn>
+              <a:cxn ang="0">
+                <a:pos x="connsiteX3" y="connsiteY3"/>
+              </a:cxn>
+              <a:cxn ang="0">
+                <a:pos x="connsiteX4" y="connsiteY4"/>
+              </a:cxn>
+              <a:cxn ang="0">
+                <a:pos x="connsiteX5" y="connsiteY5"/>
+              </a:cxn>
+              <a:cxn ang="0">
+                <a:pos x="connsiteX6" y="connsiteY6"/>
+              </a:cxn>
+              <a:cxn ang="0">
+                <a:pos x="connsiteX7" y="connsiteY7"/>
+              </a:cxn>
+              <a:cxn ang="0">
+                <a:pos x="connsiteX8" y="connsiteY8"/>
+              </a:cxn>
+              <a:cxn ang="0">
+                <a:pos x="connsiteX9" y="connsiteY9"/>
+              </a:cxn>
+              <a:cxn ang="0">
+                <a:pos x="connsiteX10" y="connsiteY10"/>
+              </a:cxn>
+            </a:cxnLst>
+            <a:rect l="l" t="t" r="r" b="b"/>
+            <a:pathLst>
+              <a:path w="12192000" h="4537825">
+                <a:moveTo>
+                  <a:pt x="0" y="0"/>
+                </a:moveTo>
+                <a:lnTo>
+                  <a:pt x="12192000" y="0"/>
+                </a:lnTo>
+                <a:lnTo>
+                  <a:pt x="12192000" y="3020937"/>
+                </a:lnTo>
+                <a:lnTo>
+                  <a:pt x="12192000" y="3213062"/>
+                </a:lnTo>
+                <a:lnTo>
+                  <a:pt x="12192000" y="4188880"/>
+                </a:lnTo>
+                <a:lnTo>
+                  <a:pt x="12113803" y="4197163"/>
+                </a:lnTo>
+                <a:cubicBezTo>
+                  <a:pt x="10139508" y="4395112"/>
+                  <a:pt x="8237152" y="4488115"/>
+                  <a:pt x="6753597" y="4520720"/>
+                </a:cubicBezTo>
+                <a:cubicBezTo>
+                  <a:pt x="4940362" y="4560569"/>
+                  <a:pt x="2657278" y="4541239"/>
+                  <a:pt x="400746" y="4349377"/>
+                </a:cubicBezTo>
+                <a:lnTo>
+                  <a:pt x="0" y="4312401"/>
+                </a:lnTo>
+                <a:lnTo>
+                  <a:pt x="0" y="3213062"/>
+                </a:lnTo>
+                <a:lnTo>
+                  <a:pt x="0" y="3020937"/>
+                </a:lnTo>
+                <a:close/>
+              </a:path>
+            </a:pathLst>
+          </a:custGeom>
+          <a:solidFill>
+            <a:schemeClr val="tx1"/>
+          </a:solidFill>
+          <a:ln w="44450">
+            <a:noFill/>
+          </a:ln>
+          <a:effectLst/>
+        </p:spPr>
+        <p:style>
+          <a:lnRef idx="2">
+            <a:schemeClr val="accent1">
+              <a:shade val="50000"/>
+            </a:schemeClr>
+          </a:lnRef>
+          <a:fillRef idx="1003">
+            <a:schemeClr val="dk2"/>
+          </a:fillRef>
+          <a:effectRef idx="0">
+            <a:schemeClr val="accent1"/>
+          </a:effectRef>
+          <a:fontRef idx="minor">
+            <a:schemeClr val="lt1"/>
+          </a:fontRef>
+        </p:style>
+        <p:txBody>
+          <a:bodyPr wrap="square" rtlCol="0" anchor="ctr">
+            <a:noAutofit/>
+          </a:bodyPr>
+          <a:lstStyle/>
+          <a:p>
+            <a:pPr algn="ctr"/>
+            <a:endParaRPr lang="en-US"/>
+          </a:p>
+        </p:txBody>
+      </p:sp>
+      <p:pic>
+        <p:nvPicPr>
+          <p:cNvPr id="9" name="Picture 8" descr="Chart, treemap chart&#10;&#10;Description automatically generated">
+            <a:extLst>
+              <a:ext uri="{FF2B5EF4-FFF2-40B4-BE49-F238E27FC236}">
+                <a16:creationId xmlns:a16="http://schemas.microsoft.com/office/drawing/2014/main" id="{916E218E-BA6D-4FC1-B7D2-BDAC22DD5255}"/>
+              </a:ext>
+            </a:extLst>
+          </p:cNvPr>
+          <p:cNvPicPr>
+            <a:picLocks noChangeAspect="1"/>
+          </p:cNvPicPr>
+          <p:nvPr/>
+        </p:nvPicPr>
+        <p:blipFill>
+          <a:blip r:embed="rId2"/>
+          <a:stretch>
+            <a:fillRect/>
+          </a:stretch>
+        </p:blipFill>
+        <p:spPr>
+          <a:xfrm>
+            <a:off x="643467" y="687794"/>
+            <a:ext cx="3539970" cy="3132873"/>
+          </a:xfrm>
+          <a:prstGeom prst="rect">
+            <a:avLst/>
+          </a:prstGeom>
+        </p:spPr>
+      </p:pic>
+      <p:pic>
+        <p:nvPicPr>
+          <p:cNvPr id="5" name="Content Placeholder 4" descr="Chart, line chart&#10;&#10;Description automatically generated">
+            <a:extLst>
+              <a:ext uri="{FF2B5EF4-FFF2-40B4-BE49-F238E27FC236}">
+                <a16:creationId xmlns:a16="http://schemas.microsoft.com/office/drawing/2014/main" id="{7A669BAD-2A9F-47D7-B2DF-E0A123D16B60}"/>
+              </a:ext>
+            </a:extLst>
+          </p:cNvPr>
+          <p:cNvPicPr>
+            <a:picLocks noChangeAspect="1"/>
+          </p:cNvPicPr>
+          <p:nvPr/>
+        </p:nvPicPr>
+        <p:blipFill>
+          <a:blip r:embed="rId3"/>
+          <a:stretch>
+            <a:fillRect/>
+          </a:stretch>
+        </p:blipFill>
+        <p:spPr>
+          <a:xfrm>
+            <a:off x="5674471" y="679984"/>
+            <a:ext cx="5443315" cy="2748874"/>
+          </a:xfrm>
+          <a:prstGeom prst="rect">
+            <a:avLst/>
+          </a:prstGeom>
+        </p:spPr>
+      </p:pic>
+      <p:sp>
+        <p:nvSpPr>
+          <p:cNvPr id="42" name="Content Placeholder 12">
+            <a:extLst>
+              <a:ext uri="{FF2B5EF4-FFF2-40B4-BE49-F238E27FC236}">
+                <a16:creationId xmlns:a16="http://schemas.microsoft.com/office/drawing/2014/main" id="{D4497081-377A-4FD9-8071-7E719C390C60}"/>
               </a:ext>
             </a:extLst>
           </p:cNvPr>
@@ -23586,24 +25358,38 @@
             <p:ph idx="1"/>
           </p:nvPr>
         </p:nvSpPr>
-        <p:spPr/>
+        <p:spPr>
+          <a:xfrm>
+            <a:off x="5308264" y="5355735"/>
+            <a:ext cx="6281873" cy="422712"/>
+          </a:xfrm>
+        </p:spPr>
         <p:txBody>
-          <a:bodyPr/>
+          <a:bodyPr>
+            <a:normAutofit/>
+          </a:bodyPr>
           <a:lstStyle/>
           <a:p>
-            <a:endParaRPr lang="en-GB" dirty="0"/>
+            <a:pPr marL="0" indent="0">
+              <a:buNone/>
+            </a:pPr>
+            <a:endParaRPr lang="en-US" dirty="0">
+              <a:solidFill>
+                <a:schemeClr val="bg1"/>
+              </a:solidFill>
+            </a:endParaRPr>
           </a:p>
         </p:txBody>
       </p:sp>
     </p:spTree>
     <p:extLst>
       <p:ext uri="{BB962C8B-B14F-4D97-AF65-F5344CB8AC3E}">
-        <p14:creationId xmlns:p14="http://schemas.microsoft.com/office/powerpoint/2010/main" val="2429628857"/>
+        <p14:creationId xmlns:p14="http://schemas.microsoft.com/office/powerpoint/2010/main" val="2205005793"/>
       </p:ext>
     </p:extLst>
   </p:cSld>
   <p:clrMapOvr>
-    <a:masterClrMapping/>
+    <a:overrideClrMapping bg1="dk1" tx1="lt1" bg2="dk2" tx2="lt2" accent1="accent1" accent2="accent2" accent3="accent3" accent4="accent4" accent5="accent5" accent6="accent6" hlink="hlink" folHlink="folHlink"/>
   </p:clrMapOvr>
 </p:sld>
 </file>
@@ -23665,35 +25451,6 @@
       </p:sp>
       <p:pic>
         <p:nvPicPr>
-          <p:cNvPr id="5" name="Content Placeholder 4" descr="Graphical user interface, text&#10;&#10;Description automatically generated">
-            <a:extLst>
-              <a:ext uri="{FF2B5EF4-FFF2-40B4-BE49-F238E27FC236}">
-                <a16:creationId xmlns:a16="http://schemas.microsoft.com/office/drawing/2014/main" id="{F1DF1030-60C3-4C66-AB53-2366B29B81A8}"/>
-              </a:ext>
-            </a:extLst>
-          </p:cNvPr>
-          <p:cNvPicPr>
-            <a:picLocks noGrp="1" noChangeAspect="1"/>
-          </p:cNvPicPr>
-          <p:nvPr>
-            <p:ph idx="1"/>
-          </p:nvPr>
-        </p:nvPicPr>
-        <p:blipFill>
-          <a:blip r:embed="rId2"/>
-          <a:stretch>
-            <a:fillRect/>
-          </a:stretch>
-        </p:blipFill>
-        <p:spPr>
-          <a:xfrm>
-            <a:off x="5729621" y="377261"/>
-            <a:ext cx="4821720" cy="655125"/>
-          </a:xfrm>
-        </p:spPr>
-      </p:pic>
-      <p:pic>
-        <p:nvPicPr>
           <p:cNvPr id="7" name="Picture 6" descr="Chart, treemap chart&#10;&#10;Description automatically generated">
             <a:extLst>
               <a:ext uri="{FF2B5EF4-FFF2-40B4-BE49-F238E27FC236}">
@@ -23707,7 +25464,7 @@
           <p:nvPr/>
         </p:nvPicPr>
         <p:blipFill>
-          <a:blip r:embed="rId3"/>
+          <a:blip r:embed="rId2"/>
           <a:stretch>
             <a:fillRect/>
           </a:stretch>
@@ -23826,66 +25583,6 @@
           </a:xfrm>
         </p:spPr>
       </p:pic>
-      <p:pic>
-        <p:nvPicPr>
-          <p:cNvPr id="5" name="Picture 4">
-            <a:extLst>
-              <a:ext uri="{FF2B5EF4-FFF2-40B4-BE49-F238E27FC236}">
-                <a16:creationId xmlns:a16="http://schemas.microsoft.com/office/drawing/2014/main" id="{BF06D3F9-00DB-47BD-8473-BA8F9438F578}"/>
-              </a:ext>
-            </a:extLst>
-          </p:cNvPr>
-          <p:cNvPicPr>
-            <a:picLocks noChangeAspect="1"/>
-          </p:cNvPicPr>
-          <p:nvPr/>
-        </p:nvPicPr>
-        <p:blipFill>
-          <a:blip r:embed="rId3"/>
-          <a:stretch>
-            <a:fillRect/>
-          </a:stretch>
-        </p:blipFill>
-        <p:spPr>
-          <a:xfrm>
-            <a:off x="5553241" y="918375"/>
-            <a:ext cx="4671220" cy="687787"/>
-          </a:xfrm>
-          <a:prstGeom prst="rect">
-            <a:avLst/>
-          </a:prstGeom>
-        </p:spPr>
-      </p:pic>
-      <p:pic>
-        <p:nvPicPr>
-          <p:cNvPr id="9" name="Picture 8" descr="Text&#10;&#10;Description automatically generated with medium confidence">
-            <a:extLst>
-              <a:ext uri="{FF2B5EF4-FFF2-40B4-BE49-F238E27FC236}">
-                <a16:creationId xmlns:a16="http://schemas.microsoft.com/office/drawing/2014/main" id="{FA1FDD1E-B4CB-47AF-A2B0-DF122C7EF8A3}"/>
-              </a:ext>
-            </a:extLst>
-          </p:cNvPr>
-          <p:cNvPicPr>
-            <a:picLocks noChangeAspect="1"/>
-          </p:cNvPicPr>
-          <p:nvPr/>
-        </p:nvPicPr>
-        <p:blipFill>
-          <a:blip r:embed="rId4"/>
-          <a:stretch>
-            <a:fillRect/>
-          </a:stretch>
-        </p:blipFill>
-        <p:spPr>
-          <a:xfrm>
-            <a:off x="860056" y="5478449"/>
-            <a:ext cx="4500700" cy="774203"/>
-          </a:xfrm>
-          <a:prstGeom prst="rect">
-            <a:avLst/>
-          </a:prstGeom>
-        </p:spPr>
-      </p:pic>
     </p:spTree>
     <p:extLst>
       <p:ext uri="{BB962C8B-B14F-4D97-AF65-F5344CB8AC3E}">
@@ -24012,6 +25709,14 @@
 <file path=ppt/slides/slide20.xml><?xml version="1.0" encoding="utf-8"?>
 <p:sld xmlns:a="http://schemas.openxmlformats.org/drawingml/2006/main" xmlns:r="http://schemas.openxmlformats.org/officeDocument/2006/relationships" xmlns:p="http://schemas.openxmlformats.org/presentationml/2006/main">
   <p:cSld>
+    <p:bg>
+      <p:bgPr>
+        <a:solidFill>
+          <a:schemeClr val="bg2"/>
+        </a:solidFill>
+        <a:effectLst/>
+      </p:bgPr>
+    </p:bg>
     <p:spTree>
       <p:nvGrpSpPr>
         <p:cNvPr id="1" name=""/>
@@ -24028,6 +25733,1493 @@
       </p:grpSpPr>
       <p:sp>
         <p:nvSpPr>
+          <p:cNvPr id="14" name="Rectangle 13">
+            <a:extLst>
+              <a:ext uri="{FF2B5EF4-FFF2-40B4-BE49-F238E27FC236}">
+                <a16:creationId xmlns:a16="http://schemas.microsoft.com/office/drawing/2014/main" id="{A3BAF07C-C39E-42EB-BB22-8D46691D9735}"/>
+              </a:ext>
+              <a:ext uri="{C183D7F6-B498-43B3-948B-1728B52AA6E4}">
+                <adec:decorative xmlns:adec="http://schemas.microsoft.com/office/drawing/2017/decorative" val="1"/>
+              </a:ext>
+            </a:extLst>
+          </p:cNvPr>
+          <p:cNvSpPr>
+            <a:spLocks noGrp="1" noRot="1" noChangeAspect="1" noMove="1" noResize="1" noEditPoints="1" noAdjustHandles="1" noChangeArrowheads="1" noChangeShapeType="1" noTextEdit="1"/>
+          </p:cNvSpPr>
+          <p:nvPr>
+            <p:extLst>
+              <p:ext uri="{386F3935-93C4-4BCD-93E2-E3B085C9AB24}">
+                <p16:designElem xmlns:p16="http://schemas.microsoft.com/office/powerpoint/2015/main" val="1"/>
+              </p:ext>
+            </p:extLst>
+          </p:nvPr>
+        </p:nvSpPr>
+        <p:spPr>
+          <a:xfrm>
+            <a:off x="-1" y="0"/>
+            <a:ext cx="12193061" cy="6858000"/>
+          </a:xfrm>
+          <a:prstGeom prst="rect">
+            <a:avLst/>
+          </a:prstGeom>
+          <a:solidFill>
+            <a:schemeClr val="bg2"/>
+          </a:solidFill>
+          <a:ln>
+            <a:noFill/>
+          </a:ln>
+        </p:spPr>
+        <p:style>
+          <a:lnRef idx="2">
+            <a:schemeClr val="accent1">
+              <a:shade val="50000"/>
+            </a:schemeClr>
+          </a:lnRef>
+          <a:fillRef idx="1">
+            <a:schemeClr val="accent1"/>
+          </a:fillRef>
+          <a:effectRef idx="0">
+            <a:schemeClr val="accent1"/>
+          </a:effectRef>
+          <a:fontRef idx="minor">
+            <a:schemeClr val="lt1"/>
+          </a:fontRef>
+        </p:style>
+        <p:txBody>
+          <a:bodyPr rtlCol="0" anchor="ctr"/>
+          <a:lstStyle/>
+          <a:p>
+            <a:pPr algn="ctr"/>
+            <a:endParaRPr lang="en-US"/>
+          </a:p>
+        </p:txBody>
+      </p:sp>
+      <p:grpSp>
+        <p:nvGrpSpPr>
+          <p:cNvPr id="16" name="Group 15">
+            <a:extLst>
+              <a:ext uri="{FF2B5EF4-FFF2-40B4-BE49-F238E27FC236}">
+                <a16:creationId xmlns:a16="http://schemas.microsoft.com/office/drawing/2014/main" id="{D8E9CF54-0466-4261-9E62-0249E60E1886}"/>
+              </a:ext>
+              <a:ext uri="{C183D7F6-B498-43B3-948B-1728B52AA6E4}">
+                <adec:decorative xmlns:adec="http://schemas.microsoft.com/office/drawing/2017/decorative" val="1"/>
+              </a:ext>
+            </a:extLst>
+          </p:cNvPr>
+          <p:cNvGrpSpPr>
+            <a:grpSpLocks noGrp="1" noUngrp="1" noRot="1" noChangeAspect="1" noMove="1" noResize="1"/>
+          </p:cNvGrpSpPr>
+          <p:nvPr>
+            <p:extLst>
+              <p:ext uri="{386F3935-93C4-4BCD-93E2-E3B085C9AB24}">
+                <p16:designElem xmlns:p16="http://schemas.microsoft.com/office/powerpoint/2015/main" val="1"/>
+              </p:ext>
+            </p:extLst>
+          </p:nvPr>
+        </p:nvGrpSpPr>
+        <p:grpSpPr>
+          <a:xfrm>
+            <a:off x="-329674" y="-59376"/>
+            <a:ext cx="12515851" cy="6923798"/>
+            <a:chOff x="-329674" y="-51881"/>
+            <a:chExt cx="12515851" cy="6923798"/>
+          </a:xfrm>
+        </p:grpSpPr>
+        <p:sp>
+          <p:nvSpPr>
+            <p:cNvPr id="17" name="Freeform 5">
+              <a:extLst>
+                <a:ext uri="{FF2B5EF4-FFF2-40B4-BE49-F238E27FC236}">
+                  <a16:creationId xmlns:a16="http://schemas.microsoft.com/office/drawing/2014/main" id="{33E32106-E8B1-4F76-9EE6-58537738A3C4}"/>
+                </a:ext>
+                <a:ext uri="{C183D7F6-B498-43B3-948B-1728B52AA6E4}">
+                  <adec:decorative xmlns:adec="http://schemas.microsoft.com/office/drawing/2017/decorative" val="1"/>
+                </a:ext>
+              </a:extLst>
+            </p:cNvPr>
+            <p:cNvSpPr/>
+            <p:nvPr>
+              <p:extLst>
+                <p:ext uri="{386F3935-93C4-4BCD-93E2-E3B085C9AB24}">
+                  <p16:designElem xmlns:p16="http://schemas.microsoft.com/office/powerpoint/2015/main" val="1"/>
+                </p:ext>
+              </p:extLst>
+            </p:nvPr>
+          </p:nvSpPr>
+          <p:spPr bwMode="auto">
+            <a:xfrm>
+              <a:off x="-329674" y="1298404"/>
+              <a:ext cx="9702800" cy="5573512"/>
+            </a:xfrm>
+            <a:custGeom>
+              <a:avLst/>
+              <a:gdLst/>
+              <a:ahLst/>
+              <a:cxnLst/>
+              <a:rect l="0" t="0" r="r" b="b"/>
+              <a:pathLst>
+                <a:path w="2038" h="1169">
+                  <a:moveTo>
+                    <a:pt x="1752" y="1169"/>
+                  </a:moveTo>
+                  <a:cubicBezTo>
+                    <a:pt x="2038" y="928"/>
+                    <a:pt x="1673" y="513"/>
+                    <a:pt x="1487" y="334"/>
+                  </a:cubicBezTo>
+                  <a:cubicBezTo>
+                    <a:pt x="1316" y="170"/>
+                    <a:pt x="1099" y="43"/>
+                    <a:pt x="860" y="22"/>
+                  </a:cubicBezTo>
+                  <a:cubicBezTo>
+                    <a:pt x="621" y="0"/>
+                    <a:pt x="341" y="128"/>
+                    <a:pt x="199" y="318"/>
+                  </a:cubicBezTo>
+                  <a:cubicBezTo>
+                    <a:pt x="0" y="586"/>
+                    <a:pt x="184" y="965"/>
+                    <a:pt x="399" y="1165"/>
+                  </a:cubicBezTo>
+                </a:path>
+              </a:pathLst>
+            </a:custGeom>
+            <a:noFill/>
+            <a:ln w="9525" cap="flat">
+              <a:solidFill>
+                <a:schemeClr val="tx1">
+                  <a:alpha val="35000"/>
+                </a:schemeClr>
+              </a:solidFill>
+              <a:prstDash val="solid"/>
+              <a:miter lim="800000"/>
+              <a:headEnd/>
+              <a:tailEnd/>
+            </a:ln>
+            <a:extLst>
+              <a:ext uri="{909E8E84-426E-40DD-AFC4-6F175D3DCCD1}">
+                <a14:hiddenFill xmlns:a14="http://schemas.microsoft.com/office/drawing/2010/main">
+                  <a:solidFill>
+                    <a:srgbClr val="FFFFFF"/>
+                  </a:solidFill>
+                </a14:hiddenFill>
+              </a:ext>
+            </a:extLst>
+          </p:spPr>
+        </p:sp>
+        <p:sp>
+          <p:nvSpPr>
+            <p:cNvPr id="18" name="Freeform 6">
+              <a:extLst>
+                <a:ext uri="{FF2B5EF4-FFF2-40B4-BE49-F238E27FC236}">
+                  <a16:creationId xmlns:a16="http://schemas.microsoft.com/office/drawing/2014/main" id="{C32C2C46-A045-44FB-8A74-5EBD650C2787}"/>
+                </a:ext>
+                <a:ext uri="{C183D7F6-B498-43B3-948B-1728B52AA6E4}">
+                  <adec:decorative xmlns:adec="http://schemas.microsoft.com/office/drawing/2017/decorative" val="1"/>
+                </a:ext>
+              </a:extLst>
+            </p:cNvPr>
+            <p:cNvSpPr/>
+            <p:nvPr>
+              <p:extLst>
+                <p:ext uri="{386F3935-93C4-4BCD-93E2-E3B085C9AB24}">
+                  <p16:designElem xmlns:p16="http://schemas.microsoft.com/office/powerpoint/2015/main" val="1"/>
+                </p:ext>
+              </p:extLst>
+            </p:nvPr>
+          </p:nvSpPr>
+          <p:spPr bwMode="auto">
+            <a:xfrm>
+              <a:off x="670451" y="2018236"/>
+              <a:ext cx="7373938" cy="4848892"/>
+            </a:xfrm>
+            <a:custGeom>
+              <a:avLst/>
+              <a:gdLst/>
+              <a:ahLst/>
+              <a:cxnLst/>
+              <a:rect l="0" t="0" r="r" b="b"/>
+              <a:pathLst>
+                <a:path w="1549" h="1017">
+                  <a:moveTo>
+                    <a:pt x="1025" y="1016"/>
+                  </a:moveTo>
+                  <a:cubicBezTo>
+                    <a:pt x="1223" y="971"/>
+                    <a:pt x="1549" y="857"/>
+                    <a:pt x="1443" y="592"/>
+                  </a:cubicBezTo>
+                  <a:cubicBezTo>
+                    <a:pt x="1344" y="344"/>
+                    <a:pt x="1041" y="111"/>
+                    <a:pt x="782" y="53"/>
+                  </a:cubicBezTo>
+                  <a:cubicBezTo>
+                    <a:pt x="545" y="0"/>
+                    <a:pt x="275" y="117"/>
+                    <a:pt x="150" y="329"/>
+                  </a:cubicBezTo>
+                  <a:cubicBezTo>
+                    <a:pt x="0" y="584"/>
+                    <a:pt x="243" y="911"/>
+                    <a:pt x="477" y="1017"/>
+                  </a:cubicBezTo>
+                </a:path>
+              </a:pathLst>
+            </a:custGeom>
+            <a:noFill/>
+            <a:ln w="9525" cap="flat">
+              <a:solidFill>
+                <a:schemeClr val="tx1">
+                  <a:alpha val="35000"/>
+                </a:schemeClr>
+              </a:solidFill>
+              <a:prstDash val="solid"/>
+              <a:miter lim="800000"/>
+              <a:headEnd/>
+              <a:tailEnd/>
+            </a:ln>
+            <a:extLst>
+              <a:ext uri="{909E8E84-426E-40DD-AFC4-6F175D3DCCD1}">
+                <a14:hiddenFill xmlns:a14="http://schemas.microsoft.com/office/drawing/2010/main">
+                  <a:solidFill>
+                    <a:srgbClr val="FFFFFF"/>
+                  </a:solidFill>
+                </a14:hiddenFill>
+              </a:ext>
+            </a:extLst>
+          </p:spPr>
+        </p:sp>
+        <p:sp>
+          <p:nvSpPr>
+            <p:cNvPr id="19" name="Freeform 7">
+              <a:extLst>
+                <a:ext uri="{FF2B5EF4-FFF2-40B4-BE49-F238E27FC236}">
+                  <a16:creationId xmlns:a16="http://schemas.microsoft.com/office/drawing/2014/main" id="{6A76F79C-6683-4940-BCF7-4BCCCEE40688}"/>
+                </a:ext>
+                <a:ext uri="{C183D7F6-B498-43B3-948B-1728B52AA6E4}">
+                  <adec:decorative xmlns:adec="http://schemas.microsoft.com/office/drawing/2017/decorative" val="1"/>
+                </a:ext>
+              </a:extLst>
+            </p:cNvPr>
+            <p:cNvSpPr/>
+            <p:nvPr>
+              <p:extLst>
+                <p:ext uri="{386F3935-93C4-4BCD-93E2-E3B085C9AB24}">
+                  <p16:designElem xmlns:p16="http://schemas.microsoft.com/office/powerpoint/2015/main" val="1"/>
+                </p:ext>
+              </p:extLst>
+            </p:nvPr>
+          </p:nvSpPr>
+          <p:spPr bwMode="auto">
+            <a:xfrm>
+              <a:off x="251351" y="1788400"/>
+              <a:ext cx="8035925" cy="5083516"/>
+            </a:xfrm>
+            <a:custGeom>
+              <a:avLst/>
+              <a:gdLst/>
+              <a:ahLst/>
+              <a:cxnLst/>
+              <a:rect l="0" t="0" r="r" b="b"/>
+              <a:pathLst>
+                <a:path w="1688" h="1066">
+                  <a:moveTo>
+                    <a:pt x="1302" y="1066"/>
+                  </a:moveTo>
+                  <a:cubicBezTo>
+                    <a:pt x="1416" y="1024"/>
+                    <a:pt x="1551" y="962"/>
+                    <a:pt x="1613" y="850"/>
+                  </a:cubicBezTo>
+                  <a:cubicBezTo>
+                    <a:pt x="1688" y="715"/>
+                    <a:pt x="1606" y="575"/>
+                    <a:pt x="1517" y="471"/>
+                  </a:cubicBezTo>
+                  <a:cubicBezTo>
+                    <a:pt x="1336" y="258"/>
+                    <a:pt x="1084" y="62"/>
+                    <a:pt x="798" y="28"/>
+                  </a:cubicBezTo>
+                  <a:cubicBezTo>
+                    <a:pt x="559" y="0"/>
+                    <a:pt x="317" y="138"/>
+                    <a:pt x="181" y="333"/>
+                  </a:cubicBezTo>
+                  <a:cubicBezTo>
+                    <a:pt x="0" y="592"/>
+                    <a:pt x="191" y="907"/>
+                    <a:pt x="420" y="1066"/>
+                  </a:cubicBezTo>
+                </a:path>
+              </a:pathLst>
+            </a:custGeom>
+            <a:noFill/>
+            <a:ln w="9525" cap="flat">
+              <a:solidFill>
+                <a:schemeClr val="tx1">
+                  <a:alpha val="35000"/>
+                </a:schemeClr>
+              </a:solidFill>
+              <a:prstDash val="dash"/>
+              <a:miter lim="800000"/>
+              <a:headEnd/>
+              <a:tailEnd/>
+            </a:ln>
+            <a:extLst>
+              <a:ext uri="{909E8E84-426E-40DD-AFC4-6F175D3DCCD1}">
+                <a14:hiddenFill xmlns:a14="http://schemas.microsoft.com/office/drawing/2010/main">
+                  <a:solidFill>
+                    <a:srgbClr val="FFFFFF"/>
+                  </a:solidFill>
+                </a14:hiddenFill>
+              </a:ext>
+            </a:extLst>
+          </p:spPr>
+        </p:sp>
+        <p:sp>
+          <p:nvSpPr>
+            <p:cNvPr id="20" name="Freeform 8">
+              <a:extLst>
+                <a:ext uri="{FF2B5EF4-FFF2-40B4-BE49-F238E27FC236}">
+                  <a16:creationId xmlns:a16="http://schemas.microsoft.com/office/drawing/2014/main" id="{FF4675A3-6D07-4B1F-9BFC-AEBEA1AD067D}"/>
+                </a:ext>
+                <a:ext uri="{C183D7F6-B498-43B3-948B-1728B52AA6E4}">
+                  <adec:decorative xmlns:adec="http://schemas.microsoft.com/office/drawing/2017/decorative" val="1"/>
+                </a:ext>
+              </a:extLst>
+            </p:cNvPr>
+            <p:cNvSpPr/>
+            <p:nvPr>
+              <p:extLst>
+                <p:ext uri="{386F3935-93C4-4BCD-93E2-E3B085C9AB24}">
+                  <p16:designElem xmlns:p16="http://schemas.microsoft.com/office/powerpoint/2015/main" val="1"/>
+                </p:ext>
+              </p:extLst>
+            </p:nvPr>
+          </p:nvSpPr>
+          <p:spPr bwMode="auto">
+            <a:xfrm>
+              <a:off x="-1061" y="549842"/>
+              <a:ext cx="10334625" cy="6322075"/>
+            </a:xfrm>
+            <a:custGeom>
+              <a:avLst/>
+              <a:gdLst/>
+              <a:ahLst/>
+              <a:cxnLst/>
+              <a:rect l="0" t="0" r="r" b="b"/>
+              <a:pathLst>
+                <a:path w="2171" h="1326">
+                  <a:moveTo>
+                    <a:pt x="1873" y="1326"/>
+                  </a:moveTo>
+                  <a:cubicBezTo>
+                    <a:pt x="2171" y="1045"/>
+                    <a:pt x="1825" y="678"/>
+                    <a:pt x="1609" y="473"/>
+                  </a:cubicBezTo>
+                  <a:cubicBezTo>
+                    <a:pt x="1406" y="281"/>
+                    <a:pt x="1159" y="116"/>
+                    <a:pt x="880" y="63"/>
+                  </a:cubicBezTo>
+                  <a:cubicBezTo>
+                    <a:pt x="545" y="0"/>
+                    <a:pt x="214" y="161"/>
+                    <a:pt x="0" y="423"/>
+                  </a:cubicBezTo>
+                </a:path>
+              </a:pathLst>
+            </a:custGeom>
+            <a:noFill/>
+            <a:ln w="9525" cap="flat">
+              <a:solidFill>
+                <a:schemeClr val="tx1">
+                  <a:alpha val="35000"/>
+                </a:schemeClr>
+              </a:solidFill>
+              <a:prstDash val="solid"/>
+              <a:miter lim="800000"/>
+              <a:headEnd/>
+              <a:tailEnd/>
+            </a:ln>
+            <a:extLst>
+              <a:ext uri="{909E8E84-426E-40DD-AFC4-6F175D3DCCD1}">
+                <a14:hiddenFill xmlns:a14="http://schemas.microsoft.com/office/drawing/2010/main">
+                  <a:solidFill>
+                    <a:srgbClr val="FFFFFF"/>
+                  </a:solidFill>
+                </a14:hiddenFill>
+              </a:ext>
+            </a:extLst>
+          </p:spPr>
+        </p:sp>
+        <p:sp>
+          <p:nvSpPr>
+            <p:cNvPr id="21" name="Freeform 9">
+              <a:extLst>
+                <a:ext uri="{FF2B5EF4-FFF2-40B4-BE49-F238E27FC236}">
+                  <a16:creationId xmlns:a16="http://schemas.microsoft.com/office/drawing/2014/main" id="{765E127A-B6B7-4B1D-B7BD-6C8C969D29C3}"/>
+                </a:ext>
+                <a:ext uri="{C183D7F6-B498-43B3-948B-1728B52AA6E4}">
+                  <adec:decorative xmlns:adec="http://schemas.microsoft.com/office/drawing/2017/decorative" val="1"/>
+                </a:ext>
+              </a:extLst>
+            </p:cNvPr>
+            <p:cNvSpPr/>
+            <p:nvPr>
+              <p:extLst>
+                <p:ext uri="{386F3935-93C4-4BCD-93E2-E3B085C9AB24}">
+                  <p16:designElem xmlns:p16="http://schemas.microsoft.com/office/powerpoint/2015/main" val="1"/>
+                </p:ext>
+              </p:extLst>
+            </p:nvPr>
+          </p:nvSpPr>
+          <p:spPr bwMode="auto">
+            <a:xfrm>
+              <a:off x="3701" y="6186246"/>
+              <a:ext cx="504825" cy="681527"/>
+            </a:xfrm>
+            <a:custGeom>
+              <a:avLst/>
+              <a:gdLst/>
+              <a:ahLst/>
+              <a:cxnLst/>
+              <a:rect l="0" t="0" r="r" b="b"/>
+              <a:pathLst>
+                <a:path w="106" h="143">
+                  <a:moveTo>
+                    <a:pt x="0" y="0"/>
+                  </a:moveTo>
+                  <a:cubicBezTo>
+                    <a:pt x="35" y="54"/>
+                    <a:pt x="70" y="101"/>
+                    <a:pt x="106" y="143"/>
+                  </a:cubicBezTo>
+                </a:path>
+              </a:pathLst>
+            </a:custGeom>
+            <a:noFill/>
+            <a:ln w="4763" cap="flat">
+              <a:solidFill>
+                <a:schemeClr val="tx1">
+                  <a:alpha val="35000"/>
+                </a:schemeClr>
+              </a:solidFill>
+              <a:prstDash val="solid"/>
+              <a:miter lim="800000"/>
+              <a:headEnd/>
+              <a:tailEnd/>
+            </a:ln>
+            <a:extLst>
+              <a:ext uri="{909E8E84-426E-40DD-AFC4-6F175D3DCCD1}">
+                <a14:hiddenFill xmlns:a14="http://schemas.microsoft.com/office/drawing/2010/main">
+                  <a:solidFill>
+                    <a:srgbClr val="FFFFFF"/>
+                  </a:solidFill>
+                </a14:hiddenFill>
+              </a:ext>
+            </a:extLst>
+          </p:spPr>
+        </p:sp>
+        <p:sp>
+          <p:nvSpPr>
+            <p:cNvPr id="22" name="Freeform 10">
+              <a:extLst>
+                <a:ext uri="{FF2B5EF4-FFF2-40B4-BE49-F238E27FC236}">
+                  <a16:creationId xmlns:a16="http://schemas.microsoft.com/office/drawing/2014/main" id="{3BCA9D9E-C72C-4751-BFA9-10B85CACE3CA}"/>
+                </a:ext>
+                <a:ext uri="{C183D7F6-B498-43B3-948B-1728B52AA6E4}">
+                  <adec:decorative xmlns:adec="http://schemas.microsoft.com/office/drawing/2017/decorative" val="1"/>
+                </a:ext>
+              </a:extLst>
+            </p:cNvPr>
+            <p:cNvSpPr/>
+            <p:nvPr>
+              <p:extLst>
+                <p:ext uri="{386F3935-93C4-4BCD-93E2-E3B085C9AB24}">
+                  <p16:designElem xmlns:p16="http://schemas.microsoft.com/office/powerpoint/2015/main" val="1"/>
+                </p:ext>
+              </p:extLst>
+            </p:nvPr>
+          </p:nvSpPr>
+          <p:spPr bwMode="auto">
+            <a:xfrm>
+              <a:off x="-1061" y="-51881"/>
+              <a:ext cx="11091863" cy="6923796"/>
+            </a:xfrm>
+            <a:custGeom>
+              <a:avLst/>
+              <a:gdLst/>
+              <a:ahLst/>
+              <a:cxnLst/>
+              <a:rect l="0" t="0" r="r" b="b"/>
+              <a:pathLst>
+                <a:path w="2330" h="1452">
+                  <a:moveTo>
+                    <a:pt x="2046" y="1452"/>
+                  </a:moveTo>
+                  <a:cubicBezTo>
+                    <a:pt x="2330" y="1153"/>
+                    <a:pt x="2049" y="821"/>
+                    <a:pt x="1813" y="601"/>
+                  </a:cubicBezTo>
+                  <a:cubicBezTo>
+                    <a:pt x="1569" y="375"/>
+                    <a:pt x="1282" y="179"/>
+                    <a:pt x="956" y="97"/>
+                  </a:cubicBezTo>
+                  <a:cubicBezTo>
+                    <a:pt x="572" y="0"/>
+                    <a:pt x="292" y="101"/>
+                    <a:pt x="0" y="366"/>
+                  </a:cubicBezTo>
+                </a:path>
+              </a:pathLst>
+            </a:custGeom>
+            <a:noFill/>
+            <a:ln w="9525" cap="flat">
+              <a:solidFill>
+                <a:schemeClr val="tx1">
+                  <a:alpha val="35000"/>
+                </a:schemeClr>
+              </a:solidFill>
+              <a:prstDash val="solid"/>
+              <a:miter lim="800000"/>
+              <a:headEnd/>
+              <a:tailEnd/>
+            </a:ln>
+            <a:extLst>
+              <a:ext uri="{909E8E84-426E-40DD-AFC4-6F175D3DCCD1}">
+                <a14:hiddenFill xmlns:a14="http://schemas.microsoft.com/office/drawing/2010/main">
+                  <a:solidFill>
+                    <a:srgbClr val="FFFFFF"/>
+                  </a:solidFill>
+                </a14:hiddenFill>
+              </a:ext>
+            </a:extLst>
+          </p:spPr>
+        </p:sp>
+        <p:sp>
+          <p:nvSpPr>
+            <p:cNvPr id="23" name="Freeform 11">
+              <a:extLst>
+                <a:ext uri="{FF2B5EF4-FFF2-40B4-BE49-F238E27FC236}">
+                  <a16:creationId xmlns:a16="http://schemas.microsoft.com/office/drawing/2014/main" id="{080C708C-69BF-441B-AB75-C98160ED06DE}"/>
+                </a:ext>
+                <a:ext uri="{C183D7F6-B498-43B3-948B-1728B52AA6E4}">
+                  <adec:decorative xmlns:adec="http://schemas.microsoft.com/office/drawing/2017/decorative" val="1"/>
+                </a:ext>
+              </a:extLst>
+            </p:cNvPr>
+            <p:cNvSpPr/>
+            <p:nvPr>
+              <p:extLst>
+                <p:ext uri="{386F3935-93C4-4BCD-93E2-E3B085C9AB24}">
+                  <p16:designElem xmlns:p16="http://schemas.microsoft.com/office/powerpoint/2015/main" val="1"/>
+                </p:ext>
+              </p:extLst>
+            </p:nvPr>
+          </p:nvSpPr>
+          <p:spPr bwMode="auto">
+            <a:xfrm>
+              <a:off x="5426601" y="5579"/>
+              <a:ext cx="5788025" cy="6847184"/>
+            </a:xfrm>
+            <a:custGeom>
+              <a:avLst/>
+              <a:gdLst/>
+              <a:ahLst/>
+              <a:cxnLst/>
+              <a:rect l="0" t="0" r="r" b="b"/>
+              <a:pathLst>
+                <a:path w="1216" h="1436">
+                  <a:moveTo>
+                    <a:pt x="1094" y="1436"/>
+                  </a:moveTo>
+                  <a:cubicBezTo>
+                    <a:pt x="1216" y="1114"/>
+                    <a:pt x="904" y="770"/>
+                    <a:pt x="709" y="551"/>
+                  </a:cubicBezTo>
+                  <a:cubicBezTo>
+                    <a:pt x="509" y="327"/>
+                    <a:pt x="274" y="127"/>
+                    <a:pt x="0" y="0"/>
+                  </a:cubicBezTo>
+                </a:path>
+              </a:pathLst>
+            </a:custGeom>
+            <a:noFill/>
+            <a:ln w="9525" cap="flat">
+              <a:solidFill>
+                <a:schemeClr val="tx1">
+                  <a:alpha val="35000"/>
+                </a:schemeClr>
+              </a:solidFill>
+              <a:prstDash val="solid"/>
+              <a:miter lim="800000"/>
+              <a:headEnd/>
+              <a:tailEnd/>
+            </a:ln>
+            <a:extLst>
+              <a:ext uri="{909E8E84-426E-40DD-AFC4-6F175D3DCCD1}">
+                <a14:hiddenFill xmlns:a14="http://schemas.microsoft.com/office/drawing/2010/main">
+                  <a:solidFill>
+                    <a:srgbClr val="FFFFFF"/>
+                  </a:solidFill>
+                </a14:hiddenFill>
+              </a:ext>
+            </a:extLst>
+          </p:spPr>
+        </p:sp>
+        <p:sp>
+          <p:nvSpPr>
+            <p:cNvPr id="24" name="Freeform 12">
+              <a:extLst>
+                <a:ext uri="{FF2B5EF4-FFF2-40B4-BE49-F238E27FC236}">
+                  <a16:creationId xmlns:a16="http://schemas.microsoft.com/office/drawing/2014/main" id="{3E79964E-F8F1-4763-8892-7BC3DAE306E9}"/>
+                </a:ext>
+                <a:ext uri="{C183D7F6-B498-43B3-948B-1728B52AA6E4}">
+                  <adec:decorative xmlns:adec="http://schemas.microsoft.com/office/drawing/2017/decorative" val="1"/>
+                </a:ext>
+              </a:extLst>
+            </p:cNvPr>
+            <p:cNvSpPr/>
+            <p:nvPr>
+              <p:extLst>
+                <p:ext uri="{386F3935-93C4-4BCD-93E2-E3B085C9AB24}">
+                  <p16:designElem xmlns:p16="http://schemas.microsoft.com/office/powerpoint/2015/main" val="1"/>
+                </p:ext>
+              </p:extLst>
+            </p:nvPr>
+          </p:nvSpPr>
+          <p:spPr bwMode="auto">
+            <a:xfrm>
+              <a:off x="-1061" y="5579"/>
+              <a:ext cx="1057275" cy="614491"/>
+            </a:xfrm>
+            <a:custGeom>
+              <a:avLst/>
+              <a:gdLst/>
+              <a:ahLst/>
+              <a:cxnLst/>
+              <a:rect l="0" t="0" r="r" b="b"/>
+              <a:pathLst>
+                <a:path w="222" h="129">
+                  <a:moveTo>
+                    <a:pt x="222" y="0"/>
+                  </a:moveTo>
+                  <a:cubicBezTo>
+                    <a:pt x="152" y="35"/>
+                    <a:pt x="76" y="78"/>
+                    <a:pt x="0" y="129"/>
+                  </a:cubicBezTo>
+                </a:path>
+              </a:pathLst>
+            </a:custGeom>
+            <a:noFill/>
+            <a:ln w="9525" cap="flat">
+              <a:solidFill>
+                <a:schemeClr val="tx1">
+                  <a:alpha val="35000"/>
+                </a:schemeClr>
+              </a:solidFill>
+              <a:prstDash val="solid"/>
+              <a:miter lim="800000"/>
+              <a:headEnd/>
+              <a:tailEnd/>
+            </a:ln>
+            <a:extLst>
+              <a:ext uri="{909E8E84-426E-40DD-AFC4-6F175D3DCCD1}">
+                <a14:hiddenFill xmlns:a14="http://schemas.microsoft.com/office/drawing/2010/main">
+                  <a:solidFill>
+                    <a:srgbClr val="FFFFFF"/>
+                  </a:solidFill>
+                </a14:hiddenFill>
+              </a:ext>
+            </a:extLst>
+          </p:spPr>
+        </p:sp>
+        <p:sp>
+          <p:nvSpPr>
+            <p:cNvPr id="25" name="Freeform 13">
+              <a:extLst>
+                <a:ext uri="{FF2B5EF4-FFF2-40B4-BE49-F238E27FC236}">
+                  <a16:creationId xmlns:a16="http://schemas.microsoft.com/office/drawing/2014/main" id="{FE09592A-FCC9-4AE5-BA0B-730C6F3BBE95}"/>
+                </a:ext>
+                <a:ext uri="{C183D7F6-B498-43B3-948B-1728B52AA6E4}">
+                  <adec:decorative xmlns:adec="http://schemas.microsoft.com/office/drawing/2017/decorative" val="1"/>
+                </a:ext>
+              </a:extLst>
+            </p:cNvPr>
+            <p:cNvSpPr/>
+            <p:nvPr>
+              <p:extLst>
+                <p:ext uri="{386F3935-93C4-4BCD-93E2-E3B085C9AB24}">
+                  <p16:designElem xmlns:p16="http://schemas.microsoft.com/office/powerpoint/2015/main" val="1"/>
+                </p:ext>
+              </p:extLst>
+            </p:nvPr>
+          </p:nvSpPr>
+          <p:spPr bwMode="auto">
+            <a:xfrm>
+              <a:off x="5821889" y="5579"/>
+              <a:ext cx="5588000" cy="6866337"/>
+            </a:xfrm>
+            <a:custGeom>
+              <a:avLst/>
+              <a:gdLst/>
+              <a:ahLst/>
+              <a:cxnLst/>
+              <a:rect l="0" t="0" r="r" b="b"/>
+              <a:pathLst>
+                <a:path w="1174" h="1440">
+                  <a:moveTo>
+                    <a:pt x="1067" y="1440"/>
+                  </a:moveTo>
+                  <a:cubicBezTo>
+                    <a:pt x="1174" y="1124"/>
+                    <a:pt x="887" y="797"/>
+                    <a:pt x="698" y="577"/>
+                  </a:cubicBezTo>
+                  <a:cubicBezTo>
+                    <a:pt x="500" y="348"/>
+                    <a:pt x="270" y="141"/>
+                    <a:pt x="0" y="0"/>
+                  </a:cubicBezTo>
+                </a:path>
+              </a:pathLst>
+            </a:custGeom>
+            <a:noFill/>
+            <a:ln w="9525" cap="flat">
+              <a:solidFill>
+                <a:schemeClr val="tx1">
+                  <a:alpha val="35000"/>
+                </a:schemeClr>
+              </a:solidFill>
+              <a:prstDash val="dash"/>
+              <a:miter lim="800000"/>
+              <a:headEnd/>
+              <a:tailEnd/>
+            </a:ln>
+            <a:extLst>
+              <a:ext uri="{909E8E84-426E-40DD-AFC4-6F175D3DCCD1}">
+                <a14:hiddenFill xmlns:a14="http://schemas.microsoft.com/office/drawing/2010/main">
+                  <a:solidFill>
+                    <a:srgbClr val="FFFFFF"/>
+                  </a:solidFill>
+                </a14:hiddenFill>
+              </a:ext>
+            </a:extLst>
+          </p:spPr>
+        </p:sp>
+        <p:sp>
+          <p:nvSpPr>
+            <p:cNvPr id="26" name="Freeform 14">
+              <a:extLst>
+                <a:ext uri="{FF2B5EF4-FFF2-40B4-BE49-F238E27FC236}">
+                  <a16:creationId xmlns:a16="http://schemas.microsoft.com/office/drawing/2014/main" id="{96448994-820C-4BC1-ABF3-4579C6F99A63}"/>
+                </a:ext>
+                <a:ext uri="{C183D7F6-B498-43B3-948B-1728B52AA6E4}">
+                  <adec:decorative xmlns:adec="http://schemas.microsoft.com/office/drawing/2017/decorative" val="1"/>
+                </a:ext>
+              </a:extLst>
+            </p:cNvPr>
+            <p:cNvSpPr/>
+            <p:nvPr>
+              <p:extLst>
+                <p:ext uri="{386F3935-93C4-4BCD-93E2-E3B085C9AB24}">
+                  <p16:designElem xmlns:p16="http://schemas.microsoft.com/office/powerpoint/2015/main" val="1"/>
+                </p:ext>
+              </p:extLst>
+            </p:nvPr>
+          </p:nvSpPr>
+          <p:spPr bwMode="auto">
+            <a:xfrm>
+              <a:off x="3701" y="790"/>
+              <a:ext cx="595313" cy="352734"/>
+            </a:xfrm>
+            <a:custGeom>
+              <a:avLst/>
+              <a:gdLst/>
+              <a:ahLst/>
+              <a:cxnLst/>
+              <a:rect l="0" t="0" r="r" b="b"/>
+              <a:pathLst>
+                <a:path w="125" h="74">
+                  <a:moveTo>
+                    <a:pt x="125" y="0"/>
+                  </a:moveTo>
+                  <a:cubicBezTo>
+                    <a:pt x="85" y="22"/>
+                    <a:pt x="43" y="47"/>
+                    <a:pt x="0" y="74"/>
+                  </a:cubicBezTo>
+                </a:path>
+              </a:pathLst>
+            </a:custGeom>
+            <a:noFill/>
+            <a:ln w="9525" cap="flat">
+              <a:solidFill>
+                <a:schemeClr val="tx1">
+                  <a:alpha val="35000"/>
+                </a:schemeClr>
+              </a:solidFill>
+              <a:prstDash val="dash"/>
+              <a:miter lim="800000"/>
+              <a:headEnd/>
+              <a:tailEnd/>
+            </a:ln>
+            <a:extLst>
+              <a:ext uri="{909E8E84-426E-40DD-AFC4-6F175D3DCCD1}">
+                <a14:hiddenFill xmlns:a14="http://schemas.microsoft.com/office/drawing/2010/main">
+                  <a:solidFill>
+                    <a:srgbClr val="FFFFFF"/>
+                  </a:solidFill>
+                </a14:hiddenFill>
+              </a:ext>
+            </a:extLst>
+          </p:spPr>
+        </p:sp>
+        <p:sp>
+          <p:nvSpPr>
+            <p:cNvPr id="27" name="Freeform 15">
+              <a:extLst>
+                <a:ext uri="{FF2B5EF4-FFF2-40B4-BE49-F238E27FC236}">
+                  <a16:creationId xmlns:a16="http://schemas.microsoft.com/office/drawing/2014/main" id="{9BB0D192-565A-42B9-B292-CC032D71A6A1}"/>
+                </a:ext>
+                <a:ext uri="{C183D7F6-B498-43B3-948B-1728B52AA6E4}">
+                  <adec:decorative xmlns:adec="http://schemas.microsoft.com/office/drawing/2017/decorative" val="1"/>
+                </a:ext>
+              </a:extLst>
+            </p:cNvPr>
+            <p:cNvSpPr/>
+            <p:nvPr>
+              <p:extLst>
+                <p:ext uri="{386F3935-93C4-4BCD-93E2-E3B085C9AB24}">
+                  <p16:designElem xmlns:p16="http://schemas.microsoft.com/office/powerpoint/2015/main" val="1"/>
+                </p:ext>
+              </p:extLst>
+            </p:nvPr>
+          </p:nvSpPr>
+          <p:spPr bwMode="auto">
+            <a:xfrm>
+              <a:off x="6012389" y="5579"/>
+              <a:ext cx="5497513" cy="6866337"/>
+            </a:xfrm>
+            <a:custGeom>
+              <a:avLst/>
+              <a:gdLst/>
+              <a:ahLst/>
+              <a:cxnLst/>
+              <a:rect l="0" t="0" r="r" b="b"/>
+              <a:pathLst>
+                <a:path w="1155" h="1440">
+                  <a:moveTo>
+                    <a:pt x="1056" y="1440"/>
+                  </a:moveTo>
+                  <a:cubicBezTo>
+                    <a:pt x="1155" y="1123"/>
+                    <a:pt x="875" y="801"/>
+                    <a:pt x="686" y="580"/>
+                  </a:cubicBezTo>
+                  <a:cubicBezTo>
+                    <a:pt x="491" y="352"/>
+                    <a:pt x="264" y="145"/>
+                    <a:pt x="0" y="0"/>
+                  </a:cubicBezTo>
+                </a:path>
+              </a:pathLst>
+            </a:custGeom>
+            <a:noFill/>
+            <a:ln w="12700" cap="flat">
+              <a:solidFill>
+                <a:schemeClr val="tx1">
+                  <a:alpha val="35000"/>
+                </a:schemeClr>
+              </a:solidFill>
+              <a:prstDash val="dashDot"/>
+              <a:miter lim="800000"/>
+              <a:headEnd/>
+              <a:tailEnd/>
+            </a:ln>
+            <a:extLst>
+              <a:ext uri="{909E8E84-426E-40DD-AFC4-6F175D3DCCD1}">
+                <a14:hiddenFill xmlns:a14="http://schemas.microsoft.com/office/drawing/2010/main">
+                  <a:solidFill>
+                    <a:srgbClr val="FFFFFF"/>
+                  </a:solidFill>
+                </a14:hiddenFill>
+              </a:ext>
+            </a:extLst>
+          </p:spPr>
+        </p:sp>
+        <p:sp>
+          <p:nvSpPr>
+            <p:cNvPr id="28" name="Freeform 16">
+              <a:extLst>
+                <a:ext uri="{FF2B5EF4-FFF2-40B4-BE49-F238E27FC236}">
+                  <a16:creationId xmlns:a16="http://schemas.microsoft.com/office/drawing/2014/main" id="{6D1CA09C-5F40-4E92-A7E9-D1FCEE51283D}"/>
+                </a:ext>
+                <a:ext uri="{C183D7F6-B498-43B3-948B-1728B52AA6E4}">
+                  <adec:decorative xmlns:adec="http://schemas.microsoft.com/office/drawing/2017/decorative" val="1"/>
+                </a:ext>
+              </a:extLst>
+            </p:cNvPr>
+            <p:cNvSpPr/>
+            <p:nvPr>
+              <p:extLst>
+                <p:ext uri="{386F3935-93C4-4BCD-93E2-E3B085C9AB24}">
+                  <p16:designElem xmlns:p16="http://schemas.microsoft.com/office/powerpoint/2015/main" val="1"/>
+                </p:ext>
+              </p:extLst>
+            </p:nvPr>
+          </p:nvSpPr>
+          <p:spPr bwMode="auto">
+            <a:xfrm>
+              <a:off x="-1061" y="5579"/>
+              <a:ext cx="357188" cy="213875"/>
+            </a:xfrm>
+            <a:custGeom>
+              <a:avLst/>
+              <a:gdLst/>
+              <a:ahLst/>
+              <a:cxnLst/>
+              <a:rect l="0" t="0" r="r" b="b"/>
+              <a:pathLst>
+                <a:path w="75" h="45">
+                  <a:moveTo>
+                    <a:pt x="75" y="0"/>
+                  </a:moveTo>
+                  <a:cubicBezTo>
+                    <a:pt x="50" y="14"/>
+                    <a:pt x="25" y="29"/>
+                    <a:pt x="0" y="45"/>
+                  </a:cubicBezTo>
+                </a:path>
+              </a:pathLst>
+            </a:custGeom>
+            <a:noFill/>
+            <a:ln w="12700" cap="flat">
+              <a:solidFill>
+                <a:schemeClr val="tx1">
+                  <a:alpha val="35000"/>
+                </a:schemeClr>
+              </a:solidFill>
+              <a:prstDash val="dashDot"/>
+              <a:miter lim="800000"/>
+              <a:headEnd/>
+              <a:tailEnd/>
+            </a:ln>
+            <a:extLst>
+              <a:ext uri="{909E8E84-426E-40DD-AFC4-6F175D3DCCD1}">
+                <a14:hiddenFill xmlns:a14="http://schemas.microsoft.com/office/drawing/2010/main">
+                  <a:solidFill>
+                    <a:srgbClr val="FFFFFF"/>
+                  </a:solidFill>
+                </a14:hiddenFill>
+              </a:ext>
+            </a:extLst>
+          </p:spPr>
+        </p:sp>
+        <p:sp>
+          <p:nvSpPr>
+            <p:cNvPr id="29" name="Freeform 17">
+              <a:extLst>
+                <a:ext uri="{FF2B5EF4-FFF2-40B4-BE49-F238E27FC236}">
+                  <a16:creationId xmlns:a16="http://schemas.microsoft.com/office/drawing/2014/main" id="{379F5AA5-2E14-4880-A5A6-07AEF2AD89DB}"/>
+                </a:ext>
+                <a:ext uri="{C183D7F6-B498-43B3-948B-1728B52AA6E4}">
+                  <adec:decorative xmlns:adec="http://schemas.microsoft.com/office/drawing/2017/decorative" val="1"/>
+                </a:ext>
+              </a:extLst>
+            </p:cNvPr>
+            <p:cNvSpPr/>
+            <p:nvPr>
+              <p:extLst>
+                <p:ext uri="{386F3935-93C4-4BCD-93E2-E3B085C9AB24}">
+                  <p16:designElem xmlns:p16="http://schemas.microsoft.com/office/powerpoint/2015/main" val="1"/>
+                </p:ext>
+              </p:extLst>
+            </p:nvPr>
+          </p:nvSpPr>
+          <p:spPr bwMode="auto">
+            <a:xfrm>
+              <a:off x="6210826" y="790"/>
+              <a:ext cx="5522913" cy="6871126"/>
+            </a:xfrm>
+            <a:custGeom>
+              <a:avLst/>
+              <a:gdLst/>
+              <a:ahLst/>
+              <a:cxnLst/>
+              <a:rect l="0" t="0" r="r" b="b"/>
+              <a:pathLst>
+                <a:path w="1160" h="1441">
+                  <a:moveTo>
+                    <a:pt x="1053" y="1441"/>
+                  </a:moveTo>
+                  <a:cubicBezTo>
+                    <a:pt x="1160" y="1129"/>
+                    <a:pt x="892" y="817"/>
+                    <a:pt x="705" y="599"/>
+                  </a:cubicBezTo>
+                  <a:cubicBezTo>
+                    <a:pt x="503" y="365"/>
+                    <a:pt x="270" y="152"/>
+                    <a:pt x="0" y="0"/>
+                  </a:cubicBezTo>
+                </a:path>
+              </a:pathLst>
+            </a:custGeom>
+            <a:noFill/>
+            <a:ln w="9525" cap="flat">
+              <a:solidFill>
+                <a:schemeClr val="tx1">
+                  <a:alpha val="35000"/>
+                </a:schemeClr>
+              </a:solidFill>
+              <a:prstDash val="solid"/>
+              <a:miter lim="800000"/>
+              <a:headEnd/>
+              <a:tailEnd/>
+            </a:ln>
+            <a:extLst>
+              <a:ext uri="{909E8E84-426E-40DD-AFC4-6F175D3DCCD1}">
+                <a14:hiddenFill xmlns:a14="http://schemas.microsoft.com/office/drawing/2010/main">
+                  <a:solidFill>
+                    <a:srgbClr val="FFFFFF"/>
+                  </a:solidFill>
+                </a14:hiddenFill>
+              </a:ext>
+            </a:extLst>
+          </p:spPr>
+        </p:sp>
+        <p:sp>
+          <p:nvSpPr>
+            <p:cNvPr id="30" name="Freeform 18">
+              <a:extLst>
+                <a:ext uri="{FF2B5EF4-FFF2-40B4-BE49-F238E27FC236}">
+                  <a16:creationId xmlns:a16="http://schemas.microsoft.com/office/drawing/2014/main" id="{EF14BD32-D239-4DA3-98B3-7752073657CC}"/>
+                </a:ext>
+                <a:ext uri="{C183D7F6-B498-43B3-948B-1728B52AA6E4}">
+                  <adec:decorative xmlns:adec="http://schemas.microsoft.com/office/drawing/2017/decorative" val="1"/>
+                </a:ext>
+              </a:extLst>
+            </p:cNvPr>
+            <p:cNvSpPr/>
+            <p:nvPr>
+              <p:extLst>
+                <p:ext uri="{386F3935-93C4-4BCD-93E2-E3B085C9AB24}">
+                  <p16:designElem xmlns:p16="http://schemas.microsoft.com/office/powerpoint/2015/main" val="1"/>
+                </p:ext>
+              </p:extLst>
+            </p:nvPr>
+          </p:nvSpPr>
+          <p:spPr bwMode="auto">
+            <a:xfrm>
+              <a:off x="6463239" y="5579"/>
+              <a:ext cx="5413375" cy="6866337"/>
+            </a:xfrm>
+            <a:custGeom>
+              <a:avLst/>
+              <a:gdLst/>
+              <a:ahLst/>
+              <a:cxnLst/>
+              <a:rect l="0" t="0" r="r" b="b"/>
+              <a:pathLst>
+                <a:path w="1137" h="1440">
+                  <a:moveTo>
+                    <a:pt x="1040" y="1440"/>
+                  </a:moveTo>
+                  <a:cubicBezTo>
+                    <a:pt x="1137" y="1131"/>
+                    <a:pt x="883" y="828"/>
+                    <a:pt x="698" y="611"/>
+                  </a:cubicBezTo>
+                  <a:cubicBezTo>
+                    <a:pt x="498" y="375"/>
+                    <a:pt x="268" y="159"/>
+                    <a:pt x="0" y="0"/>
+                  </a:cubicBezTo>
+                </a:path>
+              </a:pathLst>
+            </a:custGeom>
+            <a:noFill/>
+            <a:ln w="9525" cap="flat">
+              <a:solidFill>
+                <a:schemeClr val="tx1">
+                  <a:alpha val="35000"/>
+                </a:schemeClr>
+              </a:solidFill>
+              <a:prstDash val="solid"/>
+              <a:miter lim="800000"/>
+              <a:headEnd/>
+              <a:tailEnd/>
+            </a:ln>
+            <a:extLst>
+              <a:ext uri="{909E8E84-426E-40DD-AFC4-6F175D3DCCD1}">
+                <a14:hiddenFill xmlns:a14="http://schemas.microsoft.com/office/drawing/2010/main">
+                  <a:solidFill>
+                    <a:srgbClr val="FFFFFF"/>
+                  </a:solidFill>
+                </a14:hiddenFill>
+              </a:ext>
+            </a:extLst>
+          </p:spPr>
+        </p:sp>
+        <p:sp>
+          <p:nvSpPr>
+            <p:cNvPr id="31" name="Freeform 19">
+              <a:extLst>
+                <a:ext uri="{FF2B5EF4-FFF2-40B4-BE49-F238E27FC236}">
+                  <a16:creationId xmlns:a16="http://schemas.microsoft.com/office/drawing/2014/main" id="{CF07B250-E5E4-4624-9BD7-8D513A67B731}"/>
+                </a:ext>
+                <a:ext uri="{C183D7F6-B498-43B3-948B-1728B52AA6E4}">
+                  <adec:decorative xmlns:adec="http://schemas.microsoft.com/office/drawing/2017/decorative" val="1"/>
+                </a:ext>
+              </a:extLst>
+            </p:cNvPr>
+            <p:cNvSpPr/>
+            <p:nvPr>
+              <p:extLst>
+                <p:ext uri="{386F3935-93C4-4BCD-93E2-E3B085C9AB24}">
+                  <p16:designElem xmlns:p16="http://schemas.microsoft.com/office/powerpoint/2015/main" val="1"/>
+                </p:ext>
+              </p:extLst>
+            </p:nvPr>
+          </p:nvSpPr>
+          <p:spPr bwMode="auto">
+            <a:xfrm>
+              <a:off x="6877576" y="5579"/>
+              <a:ext cx="5037138" cy="6861550"/>
+            </a:xfrm>
+            <a:custGeom>
+              <a:avLst/>
+              <a:gdLst/>
+              <a:ahLst/>
+              <a:cxnLst/>
+              <a:rect l="0" t="0" r="r" b="b"/>
+              <a:pathLst>
+                <a:path w="1058" h="1439">
+                  <a:moveTo>
+                    <a:pt x="1011" y="1439"/>
+                  </a:moveTo>
+                  <a:cubicBezTo>
+                    <a:pt x="1058" y="1131"/>
+                    <a:pt x="825" y="841"/>
+                    <a:pt x="648" y="617"/>
+                  </a:cubicBezTo>
+                  <a:cubicBezTo>
+                    <a:pt x="462" y="383"/>
+                    <a:pt x="248" y="168"/>
+                    <a:pt x="0" y="0"/>
+                  </a:cubicBezTo>
+                </a:path>
+              </a:pathLst>
+            </a:custGeom>
+            <a:noFill/>
+            <a:ln w="9525" cap="flat">
+              <a:solidFill>
+                <a:schemeClr val="tx1">
+                  <a:alpha val="35000"/>
+                </a:schemeClr>
+              </a:solidFill>
+              <a:prstDash val="solid"/>
+              <a:miter lim="800000"/>
+              <a:headEnd/>
+              <a:tailEnd/>
+            </a:ln>
+            <a:extLst>
+              <a:ext uri="{909E8E84-426E-40DD-AFC4-6F175D3DCCD1}">
+                <a14:hiddenFill xmlns:a14="http://schemas.microsoft.com/office/drawing/2010/main">
+                  <a:solidFill>
+                    <a:srgbClr val="FFFFFF"/>
+                  </a:solidFill>
+                </a14:hiddenFill>
+              </a:ext>
+            </a:extLst>
+          </p:spPr>
+        </p:sp>
+        <p:sp>
+          <p:nvSpPr>
+            <p:cNvPr id="32" name="Freeform 20">
+              <a:extLst>
+                <a:ext uri="{FF2B5EF4-FFF2-40B4-BE49-F238E27FC236}">
+                  <a16:creationId xmlns:a16="http://schemas.microsoft.com/office/drawing/2014/main" id="{BCC5D120-7C8C-4290-865C-4EE6E4F245F9}"/>
+                </a:ext>
+                <a:ext uri="{C183D7F6-B498-43B3-948B-1728B52AA6E4}">
+                  <adec:decorative xmlns:adec="http://schemas.microsoft.com/office/drawing/2017/decorative" val="1"/>
+                </a:ext>
+              </a:extLst>
+            </p:cNvPr>
+            <p:cNvSpPr/>
+            <p:nvPr>
+              <p:extLst>
+                <p:ext uri="{386F3935-93C4-4BCD-93E2-E3B085C9AB24}">
+                  <p16:designElem xmlns:p16="http://schemas.microsoft.com/office/powerpoint/2015/main" val="1"/>
+                </p:ext>
+              </p:extLst>
+            </p:nvPr>
+          </p:nvSpPr>
+          <p:spPr bwMode="auto">
+            <a:xfrm>
+              <a:off x="8768289" y="5579"/>
+              <a:ext cx="3417888" cy="2742066"/>
+            </a:xfrm>
+            <a:custGeom>
+              <a:avLst/>
+              <a:gdLst/>
+              <a:ahLst/>
+              <a:cxnLst/>
+              <a:rect l="0" t="0" r="r" b="b"/>
+              <a:pathLst>
+                <a:path w="718" h="575">
+                  <a:moveTo>
+                    <a:pt x="718" y="575"/>
+                  </a:moveTo>
+                  <a:cubicBezTo>
+                    <a:pt x="500" y="360"/>
+                    <a:pt x="260" y="163"/>
+                    <a:pt x="0" y="0"/>
+                  </a:cubicBezTo>
+                </a:path>
+              </a:pathLst>
+            </a:custGeom>
+            <a:noFill/>
+            <a:ln w="9525" cap="flat">
+              <a:solidFill>
+                <a:schemeClr val="tx1">
+                  <a:alpha val="35000"/>
+                </a:schemeClr>
+              </a:solidFill>
+              <a:prstDash val="solid"/>
+              <a:miter lim="800000"/>
+              <a:headEnd/>
+              <a:tailEnd/>
+            </a:ln>
+            <a:extLst>
+              <a:ext uri="{909E8E84-426E-40DD-AFC4-6F175D3DCCD1}">
+                <a14:hiddenFill xmlns:a14="http://schemas.microsoft.com/office/drawing/2010/main">
+                  <a:solidFill>
+                    <a:srgbClr val="FFFFFF"/>
+                  </a:solidFill>
+                </a14:hiddenFill>
+              </a:ext>
+            </a:extLst>
+          </p:spPr>
+        </p:sp>
+        <p:sp>
+          <p:nvSpPr>
+            <p:cNvPr id="33" name="Freeform 21">
+              <a:extLst>
+                <a:ext uri="{FF2B5EF4-FFF2-40B4-BE49-F238E27FC236}">
+                  <a16:creationId xmlns:a16="http://schemas.microsoft.com/office/drawing/2014/main" id="{C24688C6-CAE5-4EF2-B2BA-A138DA0A24B9}"/>
+                </a:ext>
+                <a:ext uri="{C183D7F6-B498-43B3-948B-1728B52AA6E4}">
+                  <adec:decorative xmlns:adec="http://schemas.microsoft.com/office/drawing/2017/decorative" val="1"/>
+                </a:ext>
+              </a:extLst>
+            </p:cNvPr>
+            <p:cNvSpPr/>
+            <p:nvPr>
+              <p:extLst>
+                <p:ext uri="{386F3935-93C4-4BCD-93E2-E3B085C9AB24}">
+                  <p16:designElem xmlns:p16="http://schemas.microsoft.com/office/powerpoint/2015/main" val="1"/>
+                </p:ext>
+              </p:extLst>
+            </p:nvPr>
+          </p:nvSpPr>
+          <p:spPr bwMode="auto">
+            <a:xfrm>
+              <a:off x="9235014" y="10367"/>
+              <a:ext cx="2951163" cy="2555325"/>
+            </a:xfrm>
+            <a:custGeom>
+              <a:avLst/>
+              <a:gdLst/>
+              <a:ahLst/>
+              <a:cxnLst/>
+              <a:rect l="0" t="0" r="r" b="b"/>
+              <a:pathLst>
+                <a:path w="620" h="536">
+                  <a:moveTo>
+                    <a:pt x="620" y="536"/>
+                  </a:moveTo>
+                  <a:cubicBezTo>
+                    <a:pt x="404" y="314"/>
+                    <a:pt x="196" y="138"/>
+                    <a:pt x="0" y="0"/>
+                  </a:cubicBezTo>
+                </a:path>
+              </a:pathLst>
+            </a:custGeom>
+            <a:noFill/>
+            <a:ln w="9525" cap="flat">
+              <a:solidFill>
+                <a:schemeClr val="tx1">
+                  <a:alpha val="35000"/>
+                </a:schemeClr>
+              </a:solidFill>
+              <a:prstDash val="solid"/>
+              <a:miter lim="800000"/>
+              <a:headEnd/>
+              <a:tailEnd/>
+            </a:ln>
+            <a:extLst>
+              <a:ext uri="{909E8E84-426E-40DD-AFC4-6F175D3DCCD1}">
+                <a14:hiddenFill xmlns:a14="http://schemas.microsoft.com/office/drawing/2010/main">
+                  <a:solidFill>
+                    <a:srgbClr val="FFFFFF"/>
+                  </a:solidFill>
+                </a14:hiddenFill>
+              </a:ext>
+            </a:extLst>
+          </p:spPr>
+        </p:sp>
+        <p:sp>
+          <p:nvSpPr>
+            <p:cNvPr id="34" name="Freeform 22">
+              <a:extLst>
+                <a:ext uri="{FF2B5EF4-FFF2-40B4-BE49-F238E27FC236}">
+                  <a16:creationId xmlns:a16="http://schemas.microsoft.com/office/drawing/2014/main" id="{6BD31099-7C13-4901-A04F-632B1CD84627}"/>
+                </a:ext>
+                <a:ext uri="{C183D7F6-B498-43B3-948B-1728B52AA6E4}">
+                  <adec:decorative xmlns:adec="http://schemas.microsoft.com/office/drawing/2017/decorative" val="1"/>
+                </a:ext>
+              </a:extLst>
+            </p:cNvPr>
+            <p:cNvSpPr/>
+            <p:nvPr>
+              <p:extLst>
+                <p:ext uri="{386F3935-93C4-4BCD-93E2-E3B085C9AB24}">
+                  <p16:designElem xmlns:p16="http://schemas.microsoft.com/office/powerpoint/2015/main" val="1"/>
+                </p:ext>
+              </p:extLst>
+            </p:nvPr>
+          </p:nvSpPr>
+          <p:spPr bwMode="auto">
+            <a:xfrm>
+              <a:off x="10020826" y="5579"/>
+              <a:ext cx="2165350" cy="1358265"/>
+            </a:xfrm>
+            <a:custGeom>
+              <a:avLst/>
+              <a:gdLst/>
+              <a:ahLst/>
+              <a:cxnLst/>
+              <a:rect l="0" t="0" r="r" b="b"/>
+              <a:pathLst>
+                <a:path w="455" h="285">
+                  <a:moveTo>
+                    <a:pt x="0" y="0"/>
+                  </a:moveTo>
+                  <a:cubicBezTo>
+                    <a:pt x="153" y="85"/>
+                    <a:pt x="308" y="180"/>
+                    <a:pt x="455" y="285"/>
+                  </a:cubicBezTo>
+                </a:path>
+              </a:pathLst>
+            </a:custGeom>
+            <a:noFill/>
+            <a:ln w="9525" cap="flat">
+              <a:solidFill>
+                <a:schemeClr val="tx1">
+                  <a:alpha val="35000"/>
+                </a:schemeClr>
+              </a:solidFill>
+              <a:prstDash val="dash"/>
+              <a:miter lim="800000"/>
+              <a:headEnd/>
+              <a:tailEnd/>
+            </a:ln>
+            <a:extLst>
+              <a:ext uri="{909E8E84-426E-40DD-AFC4-6F175D3DCCD1}">
+                <a14:hiddenFill xmlns:a14="http://schemas.microsoft.com/office/drawing/2010/main">
+                  <a:solidFill>
+                    <a:srgbClr val="FFFFFF"/>
+                  </a:solidFill>
+                </a14:hiddenFill>
+              </a:ext>
+            </a:extLst>
+          </p:spPr>
+        </p:sp>
+        <p:sp>
+          <p:nvSpPr>
+            <p:cNvPr id="35" name="Freeform 23">
+              <a:extLst>
+                <a:ext uri="{FF2B5EF4-FFF2-40B4-BE49-F238E27FC236}">
+                  <a16:creationId xmlns:a16="http://schemas.microsoft.com/office/drawing/2014/main" id="{679F5FF7-82B2-4033-8FBE-63170C937833}"/>
+                </a:ext>
+                <a:ext uri="{C183D7F6-B498-43B3-948B-1728B52AA6E4}">
+                  <adec:decorative xmlns:adec="http://schemas.microsoft.com/office/drawing/2017/decorative" val="1"/>
+                </a:ext>
+              </a:extLst>
+            </p:cNvPr>
+            <p:cNvSpPr/>
+            <p:nvPr>
+              <p:extLst>
+                <p:ext uri="{386F3935-93C4-4BCD-93E2-E3B085C9AB24}">
+                  <p16:designElem xmlns:p16="http://schemas.microsoft.com/office/powerpoint/2015/main" val="1"/>
+                </p:ext>
+              </p:extLst>
+            </p:nvPr>
+          </p:nvSpPr>
+          <p:spPr bwMode="auto">
+            <a:xfrm>
+              <a:off x="11290826" y="5579"/>
+              <a:ext cx="895350" cy="534687"/>
+            </a:xfrm>
+            <a:custGeom>
+              <a:avLst/>
+              <a:gdLst/>
+              <a:ahLst/>
+              <a:cxnLst/>
+              <a:rect l="0" t="0" r="r" b="b"/>
+              <a:pathLst>
+                <a:path w="188" h="112">
+                  <a:moveTo>
+                    <a:pt x="0" y="0"/>
+                  </a:moveTo>
+                  <a:cubicBezTo>
+                    <a:pt x="63" y="36"/>
+                    <a:pt x="126" y="73"/>
+                    <a:pt x="188" y="112"/>
+                  </a:cubicBezTo>
+                </a:path>
+              </a:pathLst>
+            </a:custGeom>
+            <a:noFill/>
+            <a:ln w="9525" cap="flat">
+              <a:solidFill>
+                <a:schemeClr val="tx1">
+                  <a:alpha val="35000"/>
+                </a:schemeClr>
+              </a:solidFill>
+              <a:prstDash val="solid"/>
+              <a:miter lim="800000"/>
+              <a:headEnd/>
+              <a:tailEnd/>
+            </a:ln>
+            <a:extLst>
+              <a:ext uri="{909E8E84-426E-40DD-AFC4-6F175D3DCCD1}">
+                <a14:hiddenFill xmlns:a14="http://schemas.microsoft.com/office/drawing/2010/main">
+                  <a:solidFill>
+                    <a:srgbClr val="FFFFFF"/>
+                  </a:solidFill>
+                </a14:hiddenFill>
+              </a:ext>
+            </a:extLst>
+          </p:spPr>
+        </p:sp>
+      </p:grpSp>
+      <p:sp>
+        <p:nvSpPr>
           <p:cNvPr id="2" name="Title 1">
             <a:extLst>
               <a:ext uri="{FF2B5EF4-FFF2-40B4-BE49-F238E27FC236}">
@@ -24044,8 +27236,8 @@
         </p:nvSpPr>
         <p:spPr>
           <a:xfrm>
-            <a:off x="888632" y="2349925"/>
-            <a:ext cx="2945950" cy="2182746"/>
+            <a:off x="888630" y="4760132"/>
+            <a:ext cx="4980883" cy="1777829"/>
           </a:xfrm>
         </p:spPr>
         <p:txBody>
@@ -24054,28 +27246,247 @@
           </a:bodyPr>
           <a:lstStyle/>
           <a:p>
-            <a:pPr algn="l"/>
+            <a:pPr algn="r"/>
             <a:r>
-              <a:rPr lang="en-US" sz="2000" dirty="0"/>
+              <a:rPr lang="en-US" sz="2500" dirty="0">
+                <a:solidFill>
+                  <a:schemeClr val="tx1"/>
+                </a:solidFill>
+              </a:rPr>
               <a:t>Performance evaluated on test set:</a:t>
             </a:r>
             <a:br>
-              <a:rPr lang="en-US" sz="2000" dirty="0"/>
+              <a:rPr lang="en-US" sz="2500" dirty="0">
+                <a:solidFill>
+                  <a:schemeClr val="tx1"/>
+                </a:solidFill>
+              </a:rPr>
             </a:br>
             <a:r>
-              <a:rPr lang="en-GB" sz="2000" b="1" dirty="0"/>
+              <a:rPr lang="en-GB" sz="2500" b="1" dirty="0">
+                <a:solidFill>
+                  <a:schemeClr val="tx1"/>
+                </a:solidFill>
+              </a:rPr>
               <a:t>Resnet50 with</a:t>
             </a:r>
             <a:br>
-              <a:rPr lang="en-GB" sz="2000" b="1" dirty="0"/>
+              <a:rPr lang="en-GB" sz="2500" b="1" dirty="0">
+                <a:solidFill>
+                  <a:schemeClr val="tx1"/>
+                </a:solidFill>
+              </a:rPr>
             </a:br>
             <a:r>
-              <a:rPr lang="en-GB" sz="2000" b="1" dirty="0"/>
-              <a:t>Adams</a:t>
+              <a:rPr lang="en-GB" sz="2500" b="1" dirty="0">
+                <a:solidFill>
+                  <a:schemeClr val="tx1"/>
+                </a:solidFill>
+              </a:rPr>
+              <a:t>Adam optimiser is our final model as it has the highest F1 score and accuracy</a:t>
             </a:r>
           </a:p>
         </p:txBody>
       </p:sp>
+      <p:sp>
+        <p:nvSpPr>
+          <p:cNvPr id="37" name="Freeform: Shape 36">
+            <a:extLst>
+              <a:ext uri="{FF2B5EF4-FFF2-40B4-BE49-F238E27FC236}">
+                <a16:creationId xmlns:a16="http://schemas.microsoft.com/office/drawing/2014/main" id="{44C110BA-81E8-4247-853A-5F2B93E92E46}"/>
+              </a:ext>
+              <a:ext uri="{C183D7F6-B498-43B3-948B-1728B52AA6E4}">
+                <adec:decorative xmlns:adec="http://schemas.microsoft.com/office/drawing/2017/decorative" val="1"/>
+              </a:ext>
+            </a:extLst>
+          </p:cNvPr>
+          <p:cNvSpPr>
+            <a:spLocks noGrp="1" noRot="1" noChangeAspect="1" noMove="1" noResize="1" noEditPoints="1" noAdjustHandles="1" noChangeArrowheads="1" noChangeShapeType="1" noTextEdit="1"/>
+          </p:cNvSpPr>
+          <p:nvPr>
+            <p:extLst>
+              <p:ext uri="{386F3935-93C4-4BCD-93E2-E3B085C9AB24}">
+                <p16:designElem xmlns:p16="http://schemas.microsoft.com/office/powerpoint/2015/main" val="1"/>
+              </p:ext>
+            </p:extLst>
+          </p:nvPr>
+        </p:nvSpPr>
+        <p:spPr>
+          <a:xfrm>
+            <a:off x="0" y="0"/>
+            <a:ext cx="12192000" cy="4537825"/>
+          </a:xfrm>
+          <a:custGeom>
+            <a:avLst/>
+            <a:gdLst>
+              <a:gd name="connsiteX0" fmla="*/ 0 w 12192000"/>
+              <a:gd name="connsiteY0" fmla="*/ 0 h 4537825"/>
+              <a:gd name="connsiteX1" fmla="*/ 12192000 w 12192000"/>
+              <a:gd name="connsiteY1" fmla="*/ 0 h 4537825"/>
+              <a:gd name="connsiteX2" fmla="*/ 12192000 w 12192000"/>
+              <a:gd name="connsiteY2" fmla="*/ 3020937 h 4537825"/>
+              <a:gd name="connsiteX3" fmla="*/ 12192000 w 12192000"/>
+              <a:gd name="connsiteY3" fmla="*/ 3213062 h 4537825"/>
+              <a:gd name="connsiteX4" fmla="*/ 12192000 w 12192000"/>
+              <a:gd name="connsiteY4" fmla="*/ 4188880 h 4537825"/>
+              <a:gd name="connsiteX5" fmla="*/ 12113803 w 12192000"/>
+              <a:gd name="connsiteY5" fmla="*/ 4197163 h 4537825"/>
+              <a:gd name="connsiteX6" fmla="*/ 6753597 w 12192000"/>
+              <a:gd name="connsiteY6" fmla="*/ 4520720 h 4537825"/>
+              <a:gd name="connsiteX7" fmla="*/ 400746 w 12192000"/>
+              <a:gd name="connsiteY7" fmla="*/ 4349377 h 4537825"/>
+              <a:gd name="connsiteX8" fmla="*/ 0 w 12192000"/>
+              <a:gd name="connsiteY8" fmla="*/ 4312401 h 4537825"/>
+              <a:gd name="connsiteX9" fmla="*/ 0 w 12192000"/>
+              <a:gd name="connsiteY9" fmla="*/ 3213062 h 4537825"/>
+              <a:gd name="connsiteX10" fmla="*/ 0 w 12192000"/>
+              <a:gd name="connsiteY10" fmla="*/ 3020937 h 4537825"/>
+            </a:gdLst>
+            <a:ahLst/>
+            <a:cxnLst>
+              <a:cxn ang="0">
+                <a:pos x="connsiteX0" y="connsiteY0"/>
+              </a:cxn>
+              <a:cxn ang="0">
+                <a:pos x="connsiteX1" y="connsiteY1"/>
+              </a:cxn>
+              <a:cxn ang="0">
+                <a:pos x="connsiteX2" y="connsiteY2"/>
+              </a:cxn>
+              <a:cxn ang="0">
+                <a:pos x="connsiteX3" y="connsiteY3"/>
+              </a:cxn>
+              <a:cxn ang="0">
+                <a:pos x="connsiteX4" y="connsiteY4"/>
+              </a:cxn>
+              <a:cxn ang="0">
+                <a:pos x="connsiteX5" y="connsiteY5"/>
+              </a:cxn>
+              <a:cxn ang="0">
+                <a:pos x="connsiteX6" y="connsiteY6"/>
+              </a:cxn>
+              <a:cxn ang="0">
+                <a:pos x="connsiteX7" y="connsiteY7"/>
+              </a:cxn>
+              <a:cxn ang="0">
+                <a:pos x="connsiteX8" y="connsiteY8"/>
+              </a:cxn>
+              <a:cxn ang="0">
+                <a:pos x="connsiteX9" y="connsiteY9"/>
+              </a:cxn>
+              <a:cxn ang="0">
+                <a:pos x="connsiteX10" y="connsiteY10"/>
+              </a:cxn>
+            </a:cxnLst>
+            <a:rect l="l" t="t" r="r" b="b"/>
+            <a:pathLst>
+              <a:path w="12192000" h="4537825">
+                <a:moveTo>
+                  <a:pt x="0" y="0"/>
+                </a:moveTo>
+                <a:lnTo>
+                  <a:pt x="12192000" y="0"/>
+                </a:lnTo>
+                <a:lnTo>
+                  <a:pt x="12192000" y="3020937"/>
+                </a:lnTo>
+                <a:lnTo>
+                  <a:pt x="12192000" y="3213062"/>
+                </a:lnTo>
+                <a:lnTo>
+                  <a:pt x="12192000" y="4188880"/>
+                </a:lnTo>
+                <a:lnTo>
+                  <a:pt x="12113803" y="4197163"/>
+                </a:lnTo>
+                <a:cubicBezTo>
+                  <a:pt x="10139508" y="4395112"/>
+                  <a:pt x="8237152" y="4488115"/>
+                  <a:pt x="6753597" y="4520720"/>
+                </a:cubicBezTo>
+                <a:cubicBezTo>
+                  <a:pt x="4940362" y="4560569"/>
+                  <a:pt x="2657278" y="4541239"/>
+                  <a:pt x="400746" y="4349377"/>
+                </a:cubicBezTo>
+                <a:lnTo>
+                  <a:pt x="0" y="4312401"/>
+                </a:lnTo>
+                <a:lnTo>
+                  <a:pt x="0" y="3213062"/>
+                </a:lnTo>
+                <a:lnTo>
+                  <a:pt x="0" y="3020937"/>
+                </a:lnTo>
+                <a:close/>
+              </a:path>
+            </a:pathLst>
+          </a:custGeom>
+          <a:solidFill>
+            <a:schemeClr val="tx1"/>
+          </a:solidFill>
+          <a:ln w="44450">
+            <a:noFill/>
+          </a:ln>
+          <a:effectLst/>
+        </p:spPr>
+        <p:style>
+          <a:lnRef idx="2">
+            <a:schemeClr val="accent1">
+              <a:shade val="50000"/>
+            </a:schemeClr>
+          </a:lnRef>
+          <a:fillRef idx="1003">
+            <a:schemeClr val="dk2"/>
+          </a:fillRef>
+          <a:effectRef idx="0">
+            <a:schemeClr val="accent1"/>
+          </a:effectRef>
+          <a:fontRef idx="minor">
+            <a:schemeClr val="lt1"/>
+          </a:fontRef>
+        </p:style>
+        <p:txBody>
+          <a:bodyPr wrap="square" rtlCol="0" anchor="ctr">
+            <a:noAutofit/>
+          </a:bodyPr>
+          <a:lstStyle/>
+          <a:p>
+            <a:pPr algn="ctr"/>
+            <a:endParaRPr lang="en-US"/>
+          </a:p>
+        </p:txBody>
+      </p:sp>
+      <p:pic>
+        <p:nvPicPr>
+          <p:cNvPr id="9" name="Picture 8" descr="Chart, treemap chart&#10;&#10;Description automatically generated">
+            <a:extLst>
+              <a:ext uri="{FF2B5EF4-FFF2-40B4-BE49-F238E27FC236}">
+                <a16:creationId xmlns:a16="http://schemas.microsoft.com/office/drawing/2014/main" id="{32818654-6AB7-4AA6-82A4-3C939956BF5A}"/>
+              </a:ext>
+            </a:extLst>
+          </p:cNvPr>
+          <p:cNvPicPr>
+            <a:picLocks noChangeAspect="1"/>
+          </p:cNvPicPr>
+          <p:nvPr/>
+        </p:nvPicPr>
+        <p:blipFill>
+          <a:blip r:embed="rId2"/>
+          <a:stretch>
+            <a:fillRect/>
+          </a:stretch>
+        </p:blipFill>
+        <p:spPr>
+          <a:xfrm>
+            <a:off x="1417247" y="658995"/>
+            <a:ext cx="3749550" cy="3355848"/>
+          </a:xfrm>
+          <a:prstGeom prst="rect">
+            <a:avLst/>
+          </a:prstGeom>
+        </p:spPr>
+      </p:pic>
       <p:sp>
         <p:nvSpPr>
           <p:cNvPr id="3" name="Content Placeholder 2">
@@ -24094,12 +27505,14 @@
         </p:nvSpPr>
         <p:spPr>
           <a:xfrm>
-            <a:off x="5118447" y="78658"/>
-            <a:ext cx="6281873" cy="5973150"/>
+            <a:off x="6324600" y="4767660"/>
+            <a:ext cx="5075720" cy="1770300"/>
           </a:xfrm>
         </p:spPr>
         <p:txBody>
-          <a:bodyPr/>
+          <a:bodyPr>
+            <a:normAutofit fontScale="47500" lnSpcReduction="20000"/>
+          </a:bodyPr>
           <a:lstStyle/>
           <a:p>
             <a:endParaRPr lang="en-GB" dirty="0"/>
@@ -24120,13 +27533,28 @@
             <a:endParaRPr lang="en-GB" dirty="0"/>
           </a:p>
           <a:p>
-            <a:endParaRPr lang="en-GB" dirty="0"/>
+            <a:r>
+              <a:rPr lang="en-GB" sz="4000" b="1" spc="-150" dirty="0">
+                <a:latin typeface="+mj-lt"/>
+                <a:ea typeface="+mj-ea"/>
+                <a:cs typeface="+mj-cs"/>
+              </a:rPr>
+              <a:t>Accuracy and  F1 score all models</a:t>
+            </a:r>
           </a:p>
           <a:p>
-            <a:endParaRPr lang="en-GB" dirty="0"/>
+            <a:endParaRPr lang="en-GB" sz="4000" b="1" spc="-150" dirty="0">
+              <a:latin typeface="+mj-lt"/>
+              <a:ea typeface="+mj-ea"/>
+              <a:cs typeface="+mj-cs"/>
+            </a:endParaRPr>
           </a:p>
           <a:p>
-            <a:endParaRPr lang="en-GB" dirty="0"/>
+            <a:endParaRPr lang="en-GB" sz="4000" b="1" spc="-150" dirty="0">
+              <a:latin typeface="+mj-lt"/>
+              <a:ea typeface="+mj-ea"/>
+              <a:cs typeface="+mj-cs"/>
+            </a:endParaRPr>
           </a:p>
           <a:p>
             <a:endParaRPr lang="en-GB" dirty="0"/>
@@ -24150,40 +27578,10 @@
       </p:sp>
       <p:pic>
         <p:nvPicPr>
-          <p:cNvPr id="5" name="Picture 4" descr="Text&#10;&#10;Description automatically generated">
+          <p:cNvPr id="8" name="Picture 7" descr="Table&#10;&#10;Description automatically generated">
             <a:extLst>
               <a:ext uri="{FF2B5EF4-FFF2-40B4-BE49-F238E27FC236}">
-                <a16:creationId xmlns:a16="http://schemas.microsoft.com/office/drawing/2014/main" id="{92B57BA0-3A5B-4D72-821B-51673202D8EA}"/>
-              </a:ext>
-            </a:extLst>
-          </p:cNvPr>
-          <p:cNvPicPr>
-            <a:picLocks noChangeAspect="1"/>
-          </p:cNvPicPr>
-          <p:nvPr/>
-        </p:nvPicPr>
-        <p:blipFill>
-          <a:blip r:embed="rId2"/>
-          <a:stretch>
-            <a:fillRect/>
-          </a:stretch>
-        </p:blipFill>
-        <p:spPr>
-          <a:xfrm>
-            <a:off x="5622196" y="806192"/>
-            <a:ext cx="4343400" cy="800100"/>
-          </a:xfrm>
-          <a:prstGeom prst="rect">
-            <a:avLst/>
-          </a:prstGeom>
-        </p:spPr>
-      </p:pic>
-      <p:pic>
-        <p:nvPicPr>
-          <p:cNvPr id="9" name="Picture 8" descr="Chart, treemap chart&#10;&#10;Description automatically generated">
-            <a:extLst>
-              <a:ext uri="{FF2B5EF4-FFF2-40B4-BE49-F238E27FC236}">
-                <a16:creationId xmlns:a16="http://schemas.microsoft.com/office/drawing/2014/main" id="{32818654-6AB7-4AA6-82A4-3C939956BF5A}"/>
+                <a16:creationId xmlns:a16="http://schemas.microsoft.com/office/drawing/2014/main" id="{AB258833-0661-484D-BF88-07A44CF53F9F}"/>
               </a:ext>
             </a:extLst>
           </p:cNvPr>
@@ -24200,8 +27598,8 @@
         </p:blipFill>
         <p:spPr>
           <a:xfrm>
-            <a:off x="5118447" y="2062706"/>
-            <a:ext cx="5350899" cy="4795294"/>
+            <a:off x="6549597" y="1628567"/>
+            <a:ext cx="4086225" cy="1533525"/>
           </a:xfrm>
           <a:prstGeom prst="rect">
             <a:avLst/>
@@ -24216,7 +27614,7 @@
     </p:extLst>
   </p:cSld>
   <p:clrMapOvr>
-    <a:masterClrMapping/>
+    <a:overrideClrMapping bg1="dk1" tx1="lt1" bg2="dk2" tx2="lt2" accent1="accent1" accent2="accent2" accent3="accent3" accent4="accent4" accent5="accent5" accent6="accent6" hlink="hlink" folHlink="folHlink"/>
   </p:clrMapOvr>
 </p:sld>
 </file>
@@ -24444,7 +27842,7 @@
         </p:spPr>
         <p:txBody>
           <a:bodyPr>
-            <a:normAutofit fontScale="92500" lnSpcReduction="20000"/>
+            <a:normAutofit fontScale="85000" lnSpcReduction="20000"/>
           </a:bodyPr>
           <a:lstStyle/>
           <a:p>
@@ -24470,6 +27868,17 @@
               <a:rPr lang="en-GB" dirty="0"/>
               <a:t>Implementing class dataset</a:t>
             </a:r>
+          </a:p>
+          <a:p>
+            <a:r>
+              <a:rPr lang="en-GB" dirty="0"/>
+              <a:t>Tensor board in </a:t>
+            </a:r>
+            <a:r>
+              <a:rPr lang="en-GB" dirty="0" err="1"/>
+              <a:t>colab</a:t>
+            </a:r>
+            <a:endParaRPr lang="en-GB" dirty="0"/>
           </a:p>
           <a:p>
             <a:r>

</xml_diff>